<commit_message>
Updated K8s deployment and slides
</commit_message>
<xml_diff>
--- a/slides.pptx
+++ b/slides.pptx
@@ -9,9 +9,15 @@
     <p:sldId id="1053" r:id="rId6"/>
     <p:sldId id="1054" r:id="rId7"/>
     <p:sldId id="1048" r:id="rId8"/>
-    <p:sldId id="1047" r:id="rId9"/>
-    <p:sldId id="1049" r:id="rId10"/>
-    <p:sldId id="1056" r:id="rId11"/>
+    <p:sldId id="1057" r:id="rId9"/>
+    <p:sldId id="1058" r:id="rId10"/>
+    <p:sldId id="1059" r:id="rId11"/>
+    <p:sldId id="1060" r:id="rId12"/>
+    <p:sldId id="1061" r:id="rId13"/>
+    <p:sldId id="1047" r:id="rId14"/>
+    <p:sldId id="1062" r:id="rId15"/>
+    <p:sldId id="1049" r:id="rId16"/>
+    <p:sldId id="1056" r:id="rId17"/>
   </p:sldIdLst>
   <p:sldSz cx="12192000" cy="6858000"/>
   <p:notesSz cx="6858000" cy="9144000"/>
@@ -4447,7 +4453,7 @@
           <a:graphicData uri="http://schemas.openxmlformats.org/presentationml/2006/ole">
             <mc:AlternateContent xmlns:mc="http://schemas.openxmlformats.org/markup-compatibility/2006">
               <mc:Choice xmlns:v="urn:schemas-microsoft-com:vml" Requires="v">
-                <p:oleObj spid="_x0000_s3075" name="think-cell Slide" r:id="rId4" imgW="270" imgH="270" progId="TCLayout.ActiveDocument.1">
+                <p:oleObj spid="_x0000_s3077" name="think-cell Slide" r:id="rId4" imgW="270" imgH="270" progId="TCLayout.ActiveDocument.1">
                   <p:embed/>
                 </p:oleObj>
               </mc:Choice>
@@ -4983,7 +4989,7 @@
           <a:graphicData uri="http://schemas.openxmlformats.org/presentationml/2006/ole">
             <mc:AlternateContent xmlns:mc="http://schemas.openxmlformats.org/markup-compatibility/2006">
               <mc:Choice xmlns:v="urn:schemas-microsoft-com:vml" Requires="v">
-                <p:oleObj spid="_x0000_s4099" name="think-cell Slide" r:id="rId4" imgW="270" imgH="270" progId="TCLayout.ActiveDocument.1">
+                <p:oleObj spid="_x0000_s4101" name="think-cell Slide" r:id="rId4" imgW="270" imgH="270" progId="TCLayout.ActiveDocument.1">
                   <p:embed/>
                 </p:oleObj>
               </mc:Choice>
@@ -5236,7 +5242,7 @@
           <a:graphicData uri="http://schemas.openxmlformats.org/presentationml/2006/ole">
             <mc:AlternateContent xmlns:mc="http://schemas.openxmlformats.org/markup-compatibility/2006">
               <mc:Choice xmlns:v="urn:schemas-microsoft-com:vml" Requires="v">
-                <p:oleObj spid="_x0000_s5123" name="think-cell Slide" r:id="rId4" imgW="270" imgH="270" progId="TCLayout.ActiveDocument.1">
+                <p:oleObj spid="_x0000_s5125" name="think-cell Slide" r:id="rId4" imgW="270" imgH="270" progId="TCLayout.ActiveDocument.1">
                   <p:embed/>
                 </p:oleObj>
               </mc:Choice>
@@ -5489,7 +5495,7 @@
           <a:graphicData uri="http://schemas.openxmlformats.org/presentationml/2006/ole">
             <mc:AlternateContent xmlns:mc="http://schemas.openxmlformats.org/markup-compatibility/2006">
               <mc:Choice xmlns:v="urn:schemas-microsoft-com:vml" Requires="v">
-                <p:oleObj spid="_x0000_s6147" name="think-cell Slide" r:id="rId4" imgW="270" imgH="270" progId="TCLayout.ActiveDocument.1">
+                <p:oleObj spid="_x0000_s6149" name="think-cell Slide" r:id="rId4" imgW="270" imgH="270" progId="TCLayout.ActiveDocument.1">
                   <p:embed/>
                 </p:oleObj>
               </mc:Choice>
@@ -15039,7 +15045,7 @@
           <a:graphicData uri="http://schemas.openxmlformats.org/presentationml/2006/ole">
             <mc:AlternateContent xmlns:mc="http://schemas.openxmlformats.org/markup-compatibility/2006">
               <mc:Choice xmlns:v="urn:schemas-microsoft-com:vml" Requires="v">
-                <p:oleObj spid="_x0000_s2051" name="think-cell Slide" r:id="rId4" imgW="270" imgH="270" progId="TCLayout.ActiveDocument.1">
+                <p:oleObj spid="_x0000_s2053" name="think-cell Slide" r:id="rId4" imgW="270" imgH="270" progId="TCLayout.ActiveDocument.1">
                   <p:embed/>
                 </p:oleObj>
               </mc:Choice>
@@ -16932,7 +16938,7 @@
           <a:graphicData uri="http://schemas.openxmlformats.org/presentationml/2006/ole">
             <mc:AlternateContent xmlns:mc="http://schemas.openxmlformats.org/markup-compatibility/2006">
               <mc:Choice xmlns:v="urn:schemas-microsoft-com:vml" Requires="v">
-                <p:oleObj spid="_x0000_s7171" name="think-cell Slide" r:id="rId4" imgW="270" imgH="270" progId="TCLayout.ActiveDocument.1">
+                <p:oleObj spid="_x0000_s7173" name="think-cell Slide" r:id="rId4" imgW="270" imgH="270" progId="TCLayout.ActiveDocument.1">
                   <p:embed/>
                 </p:oleObj>
               </mc:Choice>
@@ -20548,7 +20554,7 @@
           <a:graphicData uri="http://schemas.openxmlformats.org/presentationml/2006/ole">
             <mc:AlternateContent xmlns:mc="http://schemas.openxmlformats.org/markup-compatibility/2006">
               <mc:Choice xmlns:v="urn:schemas-microsoft-com:vml" Requires="v">
-                <p:oleObj spid="_x0000_s1027" name="think-cell Slide" r:id="rId35" imgW="270" imgH="270" progId="TCLayout.ActiveDocument.1">
+                <p:oleObj spid="_x0000_s1029" name="think-cell Slide" r:id="rId35" imgW="270" imgH="270" progId="TCLayout.ActiveDocument.1">
                   <p:embed/>
                 </p:oleObj>
               </mc:Choice>
@@ -30292,7 +30298,12 @@
             <p:ph type="subTitle" idx="1"/>
           </p:nvPr>
         </p:nvSpPr>
-        <p:spPr/>
+        <p:spPr>
+          <a:xfrm>
+            <a:off x="401054" y="4073807"/>
+            <a:ext cx="11379200" cy="307777"/>
+          </a:xfrm>
+        </p:spPr>
         <p:txBody>
           <a:bodyPr/>
           <a:lstStyle/>
@@ -30357,6 +30368,291 @@
     <p:extLst>
       <p:ext uri="{BB962C8B-B14F-4D97-AF65-F5344CB8AC3E}">
         <p14:creationId xmlns:p14="http://schemas.microsoft.com/office/powerpoint/2010/main" val="966573190"/>
+      </p:ext>
+    </p:extLst>
+  </p:cSld>
+  <p:clrMapOvr>
+    <a:masterClrMapping/>
+  </p:clrMapOvr>
+</p:sld>
+</file>
+
+<file path=ppt/slides/slide10.xml><?xml version="1.0" encoding="utf-8"?>
+<p:sld xmlns:a="http://schemas.openxmlformats.org/drawingml/2006/main" xmlns:r="http://schemas.openxmlformats.org/officeDocument/2006/relationships" xmlns:p="http://schemas.openxmlformats.org/presentationml/2006/main">
+  <p:cSld>
+    <p:spTree>
+      <p:nvGrpSpPr>
+        <p:cNvPr id="1" name=""/>
+        <p:cNvGrpSpPr/>
+        <p:nvPr/>
+      </p:nvGrpSpPr>
+      <p:grpSpPr>
+        <a:xfrm>
+          <a:off x="0" y="0"/>
+          <a:ext cx="0" cy="0"/>
+          <a:chOff x="0" y="0"/>
+          <a:chExt cx="0" cy="0"/>
+        </a:xfrm>
+      </p:grpSpPr>
+      <p:sp>
+        <p:nvSpPr>
+          <p:cNvPr id="2" name="Subtitle 1">
+            <a:extLst>
+              <a:ext uri="{FF2B5EF4-FFF2-40B4-BE49-F238E27FC236}">
+                <a16:creationId xmlns:a16="http://schemas.microsoft.com/office/drawing/2014/main" id="{026DD7B0-AFDA-4751-9322-E197AAE98409}"/>
+              </a:ext>
+            </a:extLst>
+          </p:cNvPr>
+          <p:cNvSpPr>
+            <a:spLocks noGrp="1"/>
+          </p:cNvSpPr>
+          <p:nvPr>
+            <p:ph type="subTitle" idx="1"/>
+          </p:nvPr>
+        </p:nvSpPr>
+        <p:spPr/>
+        <p:txBody>
+          <a:bodyPr/>
+          <a:lstStyle/>
+          <a:p>
+            <a:endParaRPr lang="nl-NL"/>
+          </a:p>
+        </p:txBody>
+      </p:sp>
+      <p:sp>
+        <p:nvSpPr>
+          <p:cNvPr id="3" name="Text Placeholder 2">
+            <a:extLst>
+              <a:ext uri="{FF2B5EF4-FFF2-40B4-BE49-F238E27FC236}">
+                <a16:creationId xmlns:a16="http://schemas.microsoft.com/office/drawing/2014/main" id="{5A756D80-BCA6-46EC-BD76-A3424158F74D}"/>
+              </a:ext>
+            </a:extLst>
+          </p:cNvPr>
+          <p:cNvSpPr>
+            <a:spLocks noGrp="1"/>
+          </p:cNvSpPr>
+          <p:nvPr>
+            <p:ph type="body" sz="quarter" idx="10"/>
+          </p:nvPr>
+        </p:nvSpPr>
+        <p:spPr/>
+        <p:txBody>
+          <a:bodyPr/>
+          <a:lstStyle/>
+          <a:p>
+            <a:endParaRPr lang="nl-NL"/>
+          </a:p>
+        </p:txBody>
+      </p:sp>
+      <p:sp>
+        <p:nvSpPr>
+          <p:cNvPr id="4" name="Picture Placeholder 3">
+            <a:extLst>
+              <a:ext uri="{FF2B5EF4-FFF2-40B4-BE49-F238E27FC236}">
+                <a16:creationId xmlns:a16="http://schemas.microsoft.com/office/drawing/2014/main" id="{7081B9EA-D5FD-4DD1-A6D8-C3C5CEFAA573}"/>
+              </a:ext>
+            </a:extLst>
+          </p:cNvPr>
+          <p:cNvSpPr>
+            <a:spLocks noGrp="1"/>
+          </p:cNvSpPr>
+          <p:nvPr>
+            <p:ph type="pic" sz="quarter" idx="11"/>
+          </p:nvPr>
+        </p:nvSpPr>
+        <p:spPr/>
+      </p:sp>
+    </p:spTree>
+    <p:extLst>
+      <p:ext uri="{BB962C8B-B14F-4D97-AF65-F5344CB8AC3E}">
+        <p14:creationId xmlns:p14="http://schemas.microsoft.com/office/powerpoint/2010/main" val="3882376303"/>
+      </p:ext>
+    </p:extLst>
+  </p:cSld>
+  <p:clrMapOvr>
+    <a:masterClrMapping/>
+  </p:clrMapOvr>
+</p:sld>
+</file>
+
+<file path=ppt/slides/slide11.xml><?xml version="1.0" encoding="utf-8"?>
+<p:sld xmlns:a="http://schemas.openxmlformats.org/drawingml/2006/main" xmlns:r="http://schemas.openxmlformats.org/officeDocument/2006/relationships" xmlns:p="http://schemas.openxmlformats.org/presentationml/2006/main">
+  <p:cSld>
+    <p:spTree>
+      <p:nvGrpSpPr>
+        <p:cNvPr id="1" name=""/>
+        <p:cNvGrpSpPr/>
+        <p:nvPr/>
+      </p:nvGrpSpPr>
+      <p:grpSpPr>
+        <a:xfrm>
+          <a:off x="0" y="0"/>
+          <a:ext cx="0" cy="0"/>
+          <a:chOff x="0" y="0"/>
+          <a:chExt cx="0" cy="0"/>
+        </a:xfrm>
+      </p:grpSpPr>
+      <p:sp>
+        <p:nvSpPr>
+          <p:cNvPr id="6" name="Text Placeholder 5">
+            <a:extLst>
+              <a:ext uri="{FF2B5EF4-FFF2-40B4-BE49-F238E27FC236}">
+                <a16:creationId xmlns:a16="http://schemas.microsoft.com/office/drawing/2014/main" id="{E353B59D-774D-495D-B345-403B124C73CA}"/>
+              </a:ext>
+            </a:extLst>
+          </p:cNvPr>
+          <p:cNvSpPr>
+            <a:spLocks noGrp="1"/>
+          </p:cNvSpPr>
+          <p:nvPr>
+            <p:ph type="body" sz="quarter" idx="10"/>
+          </p:nvPr>
+        </p:nvSpPr>
+        <p:spPr/>
+        <p:txBody>
+          <a:bodyPr/>
+          <a:lstStyle/>
+          <a:p>
+            <a:pPr marL="342900" indent="-342900">
+              <a:buFont typeface="Arial" panose="020B0604020202020204" pitchFamily="34" charset="0"/>
+              <a:buChar char="•"/>
+            </a:pPr>
+            <a:r>
+              <a:rPr lang="en-US" dirty="0"/>
+              <a:t>Helm</a:t>
+            </a:r>
+          </a:p>
+          <a:p>
+            <a:pPr marL="342900" indent="-342900">
+              <a:buFont typeface="Arial" panose="020B0604020202020204" pitchFamily="34" charset="0"/>
+              <a:buChar char="•"/>
+            </a:pPr>
+            <a:r>
+              <a:rPr lang="en-US"/>
+              <a:t>GitOps</a:t>
+            </a:r>
+            <a:endParaRPr lang="nl-NL"/>
+          </a:p>
+        </p:txBody>
+      </p:sp>
+      <p:sp>
+        <p:nvSpPr>
+          <p:cNvPr id="5" name="Title 4">
+            <a:extLst>
+              <a:ext uri="{FF2B5EF4-FFF2-40B4-BE49-F238E27FC236}">
+                <a16:creationId xmlns:a16="http://schemas.microsoft.com/office/drawing/2014/main" id="{8CDED32E-3BF0-4EC9-8E3C-7025853BD78E}"/>
+              </a:ext>
+            </a:extLst>
+          </p:cNvPr>
+          <p:cNvSpPr>
+            <a:spLocks noGrp="1"/>
+          </p:cNvSpPr>
+          <p:nvPr>
+            <p:ph type="title"/>
+          </p:nvPr>
+        </p:nvSpPr>
+        <p:spPr/>
+        <p:txBody>
+          <a:bodyPr/>
+          <a:lstStyle/>
+          <a:p>
+            <a:r>
+              <a:rPr lang="en-US" dirty="0"/>
+              <a:t>Alternatives</a:t>
+            </a:r>
+            <a:endParaRPr lang="nl-NL" dirty="0"/>
+          </a:p>
+        </p:txBody>
+      </p:sp>
+    </p:spTree>
+    <p:extLst>
+      <p:ext uri="{BB962C8B-B14F-4D97-AF65-F5344CB8AC3E}">
+        <p14:creationId xmlns:p14="http://schemas.microsoft.com/office/powerpoint/2010/main" val="4050817173"/>
+      </p:ext>
+    </p:extLst>
+  </p:cSld>
+  <p:clrMapOvr>
+    <a:masterClrMapping/>
+  </p:clrMapOvr>
+</p:sld>
+</file>
+
+<file path=ppt/slides/slide12.xml><?xml version="1.0" encoding="utf-8"?>
+<p:sld xmlns:a="http://schemas.openxmlformats.org/drawingml/2006/main" xmlns:r="http://schemas.openxmlformats.org/officeDocument/2006/relationships" xmlns:p="http://schemas.openxmlformats.org/presentationml/2006/main">
+  <p:cSld>
+    <p:spTree>
+      <p:nvGrpSpPr>
+        <p:cNvPr id="1" name=""/>
+        <p:cNvGrpSpPr/>
+        <p:nvPr/>
+      </p:nvGrpSpPr>
+      <p:grpSpPr>
+        <a:xfrm>
+          <a:off x="0" y="0"/>
+          <a:ext cx="0" cy="0"/>
+          <a:chOff x="0" y="0"/>
+          <a:chExt cx="0" cy="0"/>
+        </a:xfrm>
+      </p:grpSpPr>
+      <p:sp>
+        <p:nvSpPr>
+          <p:cNvPr id="2" name="Text Placeholder 1">
+            <a:extLst>
+              <a:ext uri="{FF2B5EF4-FFF2-40B4-BE49-F238E27FC236}">
+                <a16:creationId xmlns:a16="http://schemas.microsoft.com/office/drawing/2014/main" id="{7F6791E4-6CE7-49C3-9299-C90FEB4C952F}"/>
+              </a:ext>
+            </a:extLst>
+          </p:cNvPr>
+          <p:cNvSpPr>
+            <a:spLocks noGrp="1"/>
+          </p:cNvSpPr>
+          <p:nvPr>
+            <p:ph type="body" sz="quarter" idx="10"/>
+          </p:nvPr>
+        </p:nvSpPr>
+        <p:spPr/>
+        <p:txBody>
+          <a:bodyPr/>
+          <a:lstStyle/>
+          <a:p>
+            <a:endParaRPr lang="nl-NL"/>
+          </a:p>
+        </p:txBody>
+      </p:sp>
+    </p:spTree>
+    <p:extLst>
+      <p:ext uri="{BB962C8B-B14F-4D97-AF65-F5344CB8AC3E}">
+        <p14:creationId xmlns:p14="http://schemas.microsoft.com/office/powerpoint/2010/main" val="1176558560"/>
+      </p:ext>
+    </p:extLst>
+  </p:cSld>
+  <p:clrMapOvr>
+    <a:masterClrMapping/>
+  </p:clrMapOvr>
+</p:sld>
+</file>
+
+<file path=ppt/slides/slide13.xml><?xml version="1.0" encoding="utf-8"?>
+<p:sld xmlns:a="http://schemas.openxmlformats.org/drawingml/2006/main" xmlns:r="http://schemas.openxmlformats.org/officeDocument/2006/relationships" xmlns:p="http://schemas.openxmlformats.org/presentationml/2006/main">
+  <p:cSld>
+    <p:spTree>
+      <p:nvGrpSpPr>
+        <p:cNvPr id="1" name=""/>
+        <p:cNvGrpSpPr/>
+        <p:nvPr/>
+      </p:nvGrpSpPr>
+      <p:grpSpPr>
+        <a:xfrm>
+          <a:off x="0" y="0"/>
+          <a:ext cx="0" cy="0"/>
+          <a:chOff x="0" y="0"/>
+          <a:chExt cx="0" cy="0"/>
+        </a:xfrm>
+      </p:grpSpPr>
+    </p:spTree>
+    <p:extLst>
+      <p:ext uri="{BB962C8B-B14F-4D97-AF65-F5344CB8AC3E}">
+        <p14:creationId xmlns:p14="http://schemas.microsoft.com/office/powerpoint/2010/main" val="683033385"/>
       </p:ext>
     </p:extLst>
   </p:cSld>
@@ -30510,7 +30806,11 @@
           <a:bodyPr/>
           <a:lstStyle/>
           <a:p>
-            <a:endParaRPr lang="nl-NL"/>
+            <a:r>
+              <a:rPr lang="en-US" dirty="0"/>
+              <a:t>First steps towards deploying apps to AKS using DevOps Pipelines</a:t>
+            </a:r>
+            <a:endParaRPr lang="nl-NL" dirty="0"/>
           </a:p>
         </p:txBody>
       </p:sp>
@@ -30530,12 +30830,21 @@
             <p:ph type="ctrTitle"/>
           </p:nvPr>
         </p:nvSpPr>
-        <p:spPr/>
+        <p:spPr>
+          <a:xfrm>
+            <a:off x="404813" y="2264961"/>
+            <a:ext cx="11329987" cy="1477328"/>
+          </a:xfrm>
+        </p:spPr>
         <p:txBody>
           <a:bodyPr/>
           <a:lstStyle/>
           <a:p>
-            <a:endParaRPr lang="nl-NL"/>
+            <a:r>
+              <a:rPr lang="en-US" dirty="0"/>
+              <a:t>CI/CD and Azure Kubernetes Services</a:t>
+            </a:r>
+            <a:endParaRPr lang="nl-NL" dirty="0"/>
           </a:p>
         </p:txBody>
       </p:sp>
@@ -30560,7 +30869,11 @@
           <a:bodyPr/>
           <a:lstStyle/>
           <a:p>
-            <a:endParaRPr lang="nl-NL"/>
+            <a:r>
+              <a:rPr lang="en-US" dirty="0"/>
+              <a:t>CI/CD and AKS</a:t>
+            </a:r>
+            <a:endParaRPr lang="nl-NL" dirty="0"/>
           </a:p>
         </p:txBody>
       </p:sp>
@@ -30596,35 +30909,10 @@
       </p:grpSpPr>
       <p:sp>
         <p:nvSpPr>
-          <p:cNvPr id="2" name="Subtitle 1">
+          <p:cNvPr id="7" name="Text Placeholder 6">
             <a:extLst>
               <a:ext uri="{FF2B5EF4-FFF2-40B4-BE49-F238E27FC236}">
-                <a16:creationId xmlns:a16="http://schemas.microsoft.com/office/drawing/2014/main" id="{026DD7B0-AFDA-4751-9322-E197AAE98409}"/>
-              </a:ext>
-            </a:extLst>
-          </p:cNvPr>
-          <p:cNvSpPr>
-            <a:spLocks noGrp="1"/>
-          </p:cNvSpPr>
-          <p:nvPr>
-            <p:ph type="subTitle" idx="1"/>
-          </p:nvPr>
-        </p:nvSpPr>
-        <p:spPr/>
-        <p:txBody>
-          <a:bodyPr/>
-          <a:lstStyle/>
-          <a:p>
-            <a:endParaRPr lang="nl-NL"/>
-          </a:p>
-        </p:txBody>
-      </p:sp>
-      <p:sp>
-        <p:nvSpPr>
-          <p:cNvPr id="3" name="Text Placeholder 2">
-            <a:extLst>
-              <a:ext uri="{FF2B5EF4-FFF2-40B4-BE49-F238E27FC236}">
-                <a16:creationId xmlns:a16="http://schemas.microsoft.com/office/drawing/2014/main" id="{5A756D80-BCA6-46EC-BD76-A3424158F74D}"/>
+                <a16:creationId xmlns:a16="http://schemas.microsoft.com/office/drawing/2014/main" id="{25CBD9A8-5736-4185-BA44-9D2C3E254B1A}"/>
               </a:ext>
             </a:extLst>
           </p:cNvPr>
@@ -30640,16 +30928,64 @@
           <a:bodyPr/>
           <a:lstStyle/>
           <a:p>
-            <a:endParaRPr lang="nl-NL"/>
+            <a:pPr marL="342900" indent="-342900">
+              <a:buFont typeface="Arial" panose="020B0604020202020204" pitchFamily="34" charset="0"/>
+              <a:buChar char="•"/>
+            </a:pPr>
+            <a:r>
+              <a:rPr lang="en-US" dirty="0"/>
+              <a:t>Joost Went</a:t>
+            </a:r>
+          </a:p>
+          <a:p>
+            <a:pPr marL="342900" indent="-342900">
+              <a:buFont typeface="Arial" panose="020B0604020202020204" pitchFamily="34" charset="0"/>
+              <a:buChar char="•"/>
+            </a:pPr>
+            <a:r>
+              <a:rPr lang="en-US" dirty="0"/>
+              <a:t>Capgemini newbie (joined in June)</a:t>
+            </a:r>
+          </a:p>
+          <a:p>
+            <a:pPr marL="342900" indent="-342900">
+              <a:buFont typeface="Arial" panose="020B0604020202020204" pitchFamily="34" charset="0"/>
+              <a:buChar char="•"/>
+            </a:pPr>
+            <a:r>
+              <a:rPr lang="en-US" dirty="0"/>
+              <a:t>Azure and </a:t>
+            </a:r>
+            <a:r>
+              <a:rPr lang="en-US" dirty="0" err="1"/>
+              <a:t>.Net</a:t>
+            </a:r>
+            <a:r>
+              <a:rPr lang="en-US" dirty="0"/>
+              <a:t> background</a:t>
+            </a:r>
+          </a:p>
+          <a:p>
+            <a:pPr marL="342900" indent="-342900">
+              <a:buFont typeface="Arial" panose="020B0604020202020204" pitchFamily="34" charset="0"/>
+              <a:buChar char="•"/>
+            </a:pPr>
+            <a:r>
+              <a:rPr lang="en-US" dirty="0"/>
+              <a:t>Certified Azure Solutions Architect and DevOps Engineer Expert</a:t>
+            </a:r>
+          </a:p>
+          <a:p>
+            <a:endParaRPr lang="nl-NL" dirty="0"/>
           </a:p>
         </p:txBody>
       </p:sp>
       <p:sp>
         <p:nvSpPr>
-          <p:cNvPr id="4" name="Picture Placeholder 3">
+          <p:cNvPr id="6" name="Title 5">
             <a:extLst>
               <a:ext uri="{FF2B5EF4-FFF2-40B4-BE49-F238E27FC236}">
-                <a16:creationId xmlns:a16="http://schemas.microsoft.com/office/drawing/2014/main" id="{7081B9EA-D5FD-4DD1-A6D8-C3C5CEFAA573}"/>
+                <a16:creationId xmlns:a16="http://schemas.microsoft.com/office/drawing/2014/main" id="{02AF3804-12FE-478D-9A21-72BBC7A9C747}"/>
               </a:ext>
             </a:extLst>
           </p:cNvPr>
@@ -30657,15 +30993,26 @@
             <a:spLocks noGrp="1"/>
           </p:cNvSpPr>
           <p:nvPr>
-            <p:ph type="pic" sz="quarter" idx="11"/>
+            <p:ph type="title"/>
           </p:nvPr>
         </p:nvSpPr>
         <p:spPr/>
+        <p:txBody>
+          <a:bodyPr/>
+          <a:lstStyle/>
+          <a:p>
+            <a:r>
+              <a:rPr lang="en-US" dirty="0"/>
+              <a:t>Introduction</a:t>
+            </a:r>
+            <a:endParaRPr lang="nl-NL" dirty="0"/>
+          </a:p>
+        </p:txBody>
       </p:sp>
     </p:spTree>
     <p:extLst>
       <p:ext uri="{BB962C8B-B14F-4D97-AF65-F5344CB8AC3E}">
-        <p14:creationId xmlns:p14="http://schemas.microsoft.com/office/powerpoint/2010/main" val="3882376303"/>
+        <p14:creationId xmlns:p14="http://schemas.microsoft.com/office/powerpoint/2010/main" val="49728986"/>
       </p:ext>
     </p:extLst>
   </p:cSld>
@@ -30697,7 +31044,7 @@
           <p:cNvPr id="2" name="Text Placeholder 1">
             <a:extLst>
               <a:ext uri="{FF2B5EF4-FFF2-40B4-BE49-F238E27FC236}">
-                <a16:creationId xmlns:a16="http://schemas.microsoft.com/office/drawing/2014/main" id="{7F6791E4-6CE7-49C3-9299-C90FEB4C952F}"/>
+                <a16:creationId xmlns:a16="http://schemas.microsoft.com/office/drawing/2014/main" id="{D0D83E6C-CAA3-466F-A2CD-B71EDD751034}"/>
               </a:ext>
             </a:extLst>
           </p:cNvPr>
@@ -30713,14 +31060,154 @@
           <a:bodyPr/>
           <a:lstStyle/>
           <a:p>
-            <a:endParaRPr lang="nl-NL"/>
+            <a:pPr marL="457200" indent="-457200">
+              <a:buFont typeface="Arial" panose="020B0604020202020204" pitchFamily="34" charset="0"/>
+              <a:buChar char="•"/>
+            </a:pPr>
+            <a:r>
+              <a:rPr lang="en-US" dirty="0"/>
+              <a:t>Kubernetes like you are used to</a:t>
+            </a:r>
+          </a:p>
+          <a:p>
+            <a:pPr marL="635000" lvl="1" indent="-457200">
+              <a:buFont typeface="Arial" panose="020B0604020202020204" pitchFamily="34" charset="0"/>
+              <a:buChar char="•"/>
+            </a:pPr>
+            <a:r>
+              <a:rPr lang="en-US" dirty="0" err="1"/>
+              <a:t>kubectl</a:t>
+            </a:r>
+            <a:r>
+              <a:rPr lang="en-US" dirty="0"/>
+              <a:t>, helm, etc.</a:t>
+            </a:r>
+          </a:p>
+          <a:p>
+            <a:pPr marL="457200" indent="-457200">
+              <a:buFont typeface="Arial" panose="020B0604020202020204" pitchFamily="34" charset="0"/>
+              <a:buChar char="•"/>
+            </a:pPr>
+            <a:endParaRPr lang="en-US" dirty="0"/>
+          </a:p>
+          <a:p>
+            <a:pPr marL="457200" indent="-457200">
+              <a:buFont typeface="Arial" panose="020B0604020202020204" pitchFamily="34" charset="0"/>
+              <a:buChar char="•"/>
+            </a:pPr>
+            <a:r>
+              <a:rPr lang="en-US" dirty="0"/>
+              <a:t>But it runs transparent on Azure Resources</a:t>
+            </a:r>
+          </a:p>
+          <a:p>
+            <a:pPr marL="635000" lvl="1" indent="-457200">
+              <a:buFont typeface="Arial" panose="020B0604020202020204" pitchFamily="34" charset="0"/>
+              <a:buChar char="•"/>
+            </a:pPr>
+            <a:r>
+              <a:rPr lang="en-US" dirty="0" err="1"/>
+              <a:t>VNet</a:t>
+            </a:r>
+            <a:r>
+              <a:rPr lang="en-US" dirty="0"/>
+              <a:t> integration (VPN, NSG, etc.)</a:t>
+            </a:r>
+          </a:p>
+          <a:p>
+            <a:pPr marL="635000" lvl="1" indent="-457200">
+              <a:buFont typeface="Arial" panose="020B0604020202020204" pitchFamily="34" charset="0"/>
+              <a:buChar char="•"/>
+            </a:pPr>
+            <a:r>
+              <a:rPr lang="en-US" dirty="0"/>
+              <a:t>Application Gateway (SSL offloading)</a:t>
+            </a:r>
+          </a:p>
+          <a:p>
+            <a:pPr marL="635000" lvl="1" indent="-457200">
+              <a:buFont typeface="Arial" panose="020B0604020202020204" pitchFamily="34" charset="0"/>
+              <a:buChar char="•"/>
+            </a:pPr>
+            <a:r>
+              <a:rPr lang="en-US" dirty="0"/>
+              <a:t>Virtual Machine </a:t>
+            </a:r>
+            <a:r>
+              <a:rPr lang="en-US" dirty="0" err="1"/>
+              <a:t>Scalesets</a:t>
+            </a:r>
+            <a:endParaRPr lang="en-US" dirty="0"/>
+          </a:p>
+          <a:p>
+            <a:pPr marL="635000" lvl="1" indent="-457200">
+              <a:buFont typeface="Arial" panose="020B0604020202020204" pitchFamily="34" charset="0"/>
+              <a:buChar char="•"/>
+            </a:pPr>
+            <a:r>
+              <a:rPr lang="en-US" dirty="0"/>
+              <a:t>Azure RBAC, managed identity</a:t>
+            </a:r>
+          </a:p>
+          <a:p>
+            <a:pPr marL="635000" lvl="1" indent="-457200">
+              <a:buFont typeface="Arial" panose="020B0604020202020204" pitchFamily="34" charset="0"/>
+              <a:buChar char="•"/>
+            </a:pPr>
+            <a:r>
+              <a:rPr lang="en-US" dirty="0"/>
+              <a:t>Azure Container Registry</a:t>
+            </a:r>
+          </a:p>
+          <a:p>
+            <a:pPr marL="635000" lvl="1" indent="-457200">
+              <a:buFont typeface="Arial" panose="020B0604020202020204" pitchFamily="34" charset="0"/>
+              <a:buChar char="•"/>
+            </a:pPr>
+            <a:endParaRPr lang="en-US" dirty="0"/>
+          </a:p>
+          <a:p>
+            <a:pPr marL="457200" indent="-457200">
+              <a:buFont typeface="Arial" panose="020B0604020202020204" pitchFamily="34" charset="0"/>
+              <a:buChar char="•"/>
+            </a:pPr>
+            <a:endParaRPr lang="nl-NL" dirty="0"/>
+          </a:p>
+        </p:txBody>
+      </p:sp>
+      <p:sp>
+        <p:nvSpPr>
+          <p:cNvPr id="3" name="Title 2">
+            <a:extLst>
+              <a:ext uri="{FF2B5EF4-FFF2-40B4-BE49-F238E27FC236}">
+                <a16:creationId xmlns:a16="http://schemas.microsoft.com/office/drawing/2014/main" id="{E5273D89-926D-4F11-AA7F-2AAA244F223F}"/>
+              </a:ext>
+            </a:extLst>
+          </p:cNvPr>
+          <p:cNvSpPr>
+            <a:spLocks noGrp="1"/>
+          </p:cNvSpPr>
+          <p:nvPr>
+            <p:ph type="title"/>
+          </p:nvPr>
+        </p:nvSpPr>
+        <p:spPr/>
+        <p:txBody>
+          <a:bodyPr/>
+          <a:lstStyle/>
+          <a:p>
+            <a:r>
+              <a:rPr lang="en-US" dirty="0"/>
+              <a:t>Azure Kubernetes Services</a:t>
+            </a:r>
+            <a:endParaRPr lang="nl-NL" dirty="0"/>
           </a:p>
         </p:txBody>
       </p:sp>
     </p:spTree>
     <p:extLst>
       <p:ext uri="{BB962C8B-B14F-4D97-AF65-F5344CB8AC3E}">
-        <p14:creationId xmlns:p14="http://schemas.microsoft.com/office/powerpoint/2010/main" val="1176558560"/>
+        <p14:creationId xmlns:p14="http://schemas.microsoft.com/office/powerpoint/2010/main" val="739543686"/>
       </p:ext>
     </p:extLst>
   </p:cSld>
@@ -30747,10 +31234,396 @@
           <a:chExt cx="0" cy="0"/>
         </a:xfrm>
       </p:grpSpPr>
+      <p:sp>
+        <p:nvSpPr>
+          <p:cNvPr id="2" name="Text Placeholder 1">
+            <a:extLst>
+              <a:ext uri="{FF2B5EF4-FFF2-40B4-BE49-F238E27FC236}">
+                <a16:creationId xmlns:a16="http://schemas.microsoft.com/office/drawing/2014/main" id="{44FCBC78-5B37-41A9-BB2F-0A94CD1D6B29}"/>
+              </a:ext>
+            </a:extLst>
+          </p:cNvPr>
+          <p:cNvSpPr>
+            <a:spLocks noGrp="1"/>
+          </p:cNvSpPr>
+          <p:nvPr>
+            <p:ph type="body" sz="quarter" idx="10"/>
+          </p:nvPr>
+        </p:nvSpPr>
+        <p:spPr/>
+        <p:txBody>
+          <a:bodyPr/>
+          <a:lstStyle/>
+          <a:p>
+            <a:pPr marL="342900" indent="-342900">
+              <a:buFontTx/>
+              <a:buChar char="-"/>
+            </a:pPr>
+            <a:r>
+              <a:rPr lang="en-US" dirty="0"/>
+              <a:t>Create a </a:t>
+            </a:r>
+            <a:r>
+              <a:rPr lang="en-US" dirty="0" err="1"/>
+              <a:t>dockerfile</a:t>
+            </a:r>
+            <a:endParaRPr lang="en-US" dirty="0"/>
+          </a:p>
+          <a:p>
+            <a:pPr marL="342900" indent="-342900">
+              <a:buFontTx/>
+              <a:buChar char="-"/>
+            </a:pPr>
+            <a:r>
+              <a:rPr lang="en-US" dirty="0"/>
+              <a:t>Create a docker image and tag it</a:t>
+            </a:r>
+          </a:p>
+          <a:p>
+            <a:pPr marL="342900" indent="-342900">
+              <a:buFontTx/>
+              <a:buChar char="-"/>
+            </a:pPr>
+            <a:r>
+              <a:rPr lang="en-US" dirty="0"/>
+              <a:t>Push the docker image to a container registry</a:t>
+            </a:r>
+          </a:p>
+          <a:p>
+            <a:pPr marL="342900" indent="-342900">
+              <a:buFontTx/>
+              <a:buChar char="-"/>
+            </a:pPr>
+            <a:r>
+              <a:rPr lang="en-US" dirty="0"/>
+              <a:t>Grant AKS access to the container registry </a:t>
+            </a:r>
+          </a:p>
+          <a:p>
+            <a:pPr marL="342900" indent="-342900">
+              <a:buFontTx/>
+              <a:buChar char="-"/>
+            </a:pPr>
+            <a:r>
+              <a:rPr lang="en-US" dirty="0"/>
+              <a:t>Update your Kubernetes deployment manifest</a:t>
+            </a:r>
+            <a:endParaRPr lang="nl-NL" dirty="0"/>
+          </a:p>
+        </p:txBody>
+      </p:sp>
+      <p:sp>
+        <p:nvSpPr>
+          <p:cNvPr id="3" name="Title 2">
+            <a:extLst>
+              <a:ext uri="{FF2B5EF4-FFF2-40B4-BE49-F238E27FC236}">
+                <a16:creationId xmlns:a16="http://schemas.microsoft.com/office/drawing/2014/main" id="{A7ABAB28-48C4-498D-B1A3-F8F06783EA85}"/>
+              </a:ext>
+            </a:extLst>
+          </p:cNvPr>
+          <p:cNvSpPr>
+            <a:spLocks noGrp="1"/>
+          </p:cNvSpPr>
+          <p:nvPr>
+            <p:ph type="title"/>
+          </p:nvPr>
+        </p:nvSpPr>
+        <p:spPr/>
+        <p:txBody>
+          <a:bodyPr/>
+          <a:lstStyle/>
+          <a:p>
+            <a:r>
+              <a:rPr lang="en-US" dirty="0"/>
+              <a:t>From Code to Deployment</a:t>
+            </a:r>
+            <a:endParaRPr lang="nl-NL" dirty="0"/>
+          </a:p>
+        </p:txBody>
+      </p:sp>
     </p:spTree>
     <p:extLst>
       <p:ext uri="{BB962C8B-B14F-4D97-AF65-F5344CB8AC3E}">
-        <p14:creationId xmlns:p14="http://schemas.microsoft.com/office/powerpoint/2010/main" val="683033385"/>
+        <p14:creationId xmlns:p14="http://schemas.microsoft.com/office/powerpoint/2010/main" val="2050583422"/>
+      </p:ext>
+    </p:extLst>
+  </p:cSld>
+  <p:clrMapOvr>
+    <a:masterClrMapping/>
+  </p:clrMapOvr>
+</p:sld>
+</file>
+
+<file path=ppt/slides/slide8.xml><?xml version="1.0" encoding="utf-8"?>
+<p:sld xmlns:a="http://schemas.openxmlformats.org/drawingml/2006/main" xmlns:r="http://schemas.openxmlformats.org/officeDocument/2006/relationships" xmlns:p="http://schemas.openxmlformats.org/presentationml/2006/main">
+  <p:cSld>
+    <p:spTree>
+      <p:nvGrpSpPr>
+        <p:cNvPr id="1" name=""/>
+        <p:cNvGrpSpPr/>
+        <p:nvPr/>
+      </p:nvGrpSpPr>
+      <p:grpSpPr>
+        <a:xfrm>
+          <a:off x="0" y="0"/>
+          <a:ext cx="0" cy="0"/>
+          <a:chOff x="0" y="0"/>
+          <a:chExt cx="0" cy="0"/>
+        </a:xfrm>
+      </p:grpSpPr>
+      <p:sp>
+        <p:nvSpPr>
+          <p:cNvPr id="2" name="Text Placeholder 1">
+            <a:extLst>
+              <a:ext uri="{FF2B5EF4-FFF2-40B4-BE49-F238E27FC236}">
+                <a16:creationId xmlns:a16="http://schemas.microsoft.com/office/drawing/2014/main" id="{B8E6636C-8E98-4D93-BD37-2A1299ED96DD}"/>
+              </a:ext>
+            </a:extLst>
+          </p:cNvPr>
+          <p:cNvSpPr>
+            <a:spLocks noGrp="1"/>
+          </p:cNvSpPr>
+          <p:nvPr>
+            <p:ph type="body" sz="quarter" idx="10"/>
+          </p:nvPr>
+        </p:nvSpPr>
+        <p:spPr/>
+        <p:txBody>
+          <a:bodyPr/>
+          <a:lstStyle/>
+          <a:p>
+            <a:pPr marL="342900" indent="-342900">
+              <a:buFontTx/>
+              <a:buChar char="-"/>
+            </a:pPr>
+            <a:r>
+              <a:rPr lang="en-US" dirty="0"/>
+              <a:t>Access to our code</a:t>
+            </a:r>
+          </a:p>
+          <a:p>
+            <a:pPr marL="342900" indent="-342900">
+              <a:buFontTx/>
+              <a:buChar char="-"/>
+            </a:pPr>
+            <a:r>
+              <a:rPr lang="en-US" dirty="0"/>
+              <a:t>Access to the container registry</a:t>
+            </a:r>
+          </a:p>
+          <a:p>
+            <a:pPr marL="342900" indent="-342900">
+              <a:buFontTx/>
+              <a:buChar char="-"/>
+            </a:pPr>
+            <a:r>
+              <a:rPr lang="en-US" dirty="0"/>
+              <a:t>Access to Kubernetes</a:t>
+            </a:r>
+            <a:endParaRPr lang="nl-NL" dirty="0"/>
+          </a:p>
+        </p:txBody>
+      </p:sp>
+      <p:sp>
+        <p:nvSpPr>
+          <p:cNvPr id="3" name="Title 2">
+            <a:extLst>
+              <a:ext uri="{FF2B5EF4-FFF2-40B4-BE49-F238E27FC236}">
+                <a16:creationId xmlns:a16="http://schemas.microsoft.com/office/drawing/2014/main" id="{F87F16E8-D99F-4D9C-9786-DDC7C7D4A47A}"/>
+              </a:ext>
+            </a:extLst>
+          </p:cNvPr>
+          <p:cNvSpPr>
+            <a:spLocks noGrp="1"/>
+          </p:cNvSpPr>
+          <p:nvPr>
+            <p:ph type="title"/>
+          </p:nvPr>
+        </p:nvSpPr>
+        <p:spPr/>
+        <p:txBody>
+          <a:bodyPr/>
+          <a:lstStyle/>
+          <a:p>
+            <a:r>
+              <a:rPr lang="en-US" dirty="0"/>
+              <a:t>What do we need in our pipeline</a:t>
+            </a:r>
+            <a:endParaRPr lang="nl-NL" dirty="0"/>
+          </a:p>
+        </p:txBody>
+      </p:sp>
+    </p:spTree>
+    <p:extLst>
+      <p:ext uri="{BB962C8B-B14F-4D97-AF65-F5344CB8AC3E}">
+        <p14:creationId xmlns:p14="http://schemas.microsoft.com/office/powerpoint/2010/main" val="2538430842"/>
+      </p:ext>
+    </p:extLst>
+  </p:cSld>
+  <p:clrMapOvr>
+    <a:masterClrMapping/>
+  </p:clrMapOvr>
+</p:sld>
+</file>
+
+<file path=ppt/slides/slide9.xml><?xml version="1.0" encoding="utf-8"?>
+<p:sld xmlns:a="http://schemas.openxmlformats.org/drawingml/2006/main" xmlns:r="http://schemas.openxmlformats.org/officeDocument/2006/relationships" xmlns:p="http://schemas.openxmlformats.org/presentationml/2006/main">
+  <p:cSld>
+    <p:spTree>
+      <p:nvGrpSpPr>
+        <p:cNvPr id="1" name=""/>
+        <p:cNvGrpSpPr/>
+        <p:nvPr/>
+      </p:nvGrpSpPr>
+      <p:grpSpPr>
+        <a:xfrm>
+          <a:off x="0" y="0"/>
+          <a:ext cx="0" cy="0"/>
+          <a:chOff x="0" y="0"/>
+          <a:chExt cx="0" cy="0"/>
+        </a:xfrm>
+      </p:grpSpPr>
+      <p:sp>
+        <p:nvSpPr>
+          <p:cNvPr id="2" name="Text Placeholder 1">
+            <a:extLst>
+              <a:ext uri="{FF2B5EF4-FFF2-40B4-BE49-F238E27FC236}">
+                <a16:creationId xmlns:a16="http://schemas.microsoft.com/office/drawing/2014/main" id="{57C6FE05-9876-4B0F-A7AB-72302E83887C}"/>
+              </a:ext>
+            </a:extLst>
+          </p:cNvPr>
+          <p:cNvSpPr>
+            <a:spLocks noGrp="1"/>
+          </p:cNvSpPr>
+          <p:nvPr>
+            <p:ph type="body" sz="quarter" idx="10"/>
+          </p:nvPr>
+        </p:nvSpPr>
+        <p:spPr/>
+        <p:txBody>
+          <a:bodyPr/>
+          <a:lstStyle/>
+          <a:p>
+            <a:pPr marL="342900" indent="-342900">
+              <a:buFontTx/>
+              <a:buChar char="-"/>
+            </a:pPr>
+            <a:r>
+              <a:rPr lang="en-US" dirty="0"/>
+              <a:t>Service Connections</a:t>
+            </a:r>
+          </a:p>
+          <a:p>
+            <a:pPr marL="520700" lvl="1" indent="-342900">
+              <a:buFontTx/>
+              <a:buChar char="-"/>
+            </a:pPr>
+            <a:r>
+              <a:rPr lang="en-US" dirty="0"/>
+              <a:t>GitHub</a:t>
+            </a:r>
+          </a:p>
+          <a:p>
+            <a:pPr marL="520700" lvl="1" indent="-342900">
+              <a:buFontTx/>
+              <a:buChar char="-"/>
+            </a:pPr>
+            <a:r>
+              <a:rPr lang="en-US" dirty="0"/>
+              <a:t>Docker Registry</a:t>
+            </a:r>
+          </a:p>
+          <a:p>
+            <a:pPr marL="520700" lvl="1" indent="-342900">
+              <a:buFontTx/>
+              <a:buChar char="-"/>
+            </a:pPr>
+            <a:r>
+              <a:rPr lang="en-US" dirty="0"/>
+              <a:t>Kubernetes </a:t>
+            </a:r>
+          </a:p>
+          <a:p>
+            <a:pPr lvl="1" indent="0">
+              <a:buNone/>
+            </a:pPr>
+            <a:endParaRPr lang="en-US" dirty="0"/>
+          </a:p>
+          <a:p>
+            <a:pPr marL="342900" indent="-342900">
+              <a:buFontTx/>
+              <a:buChar char="-"/>
+            </a:pPr>
+            <a:r>
+              <a:rPr lang="en-US" dirty="0"/>
+              <a:t>Tasks</a:t>
+            </a:r>
+          </a:p>
+          <a:p>
+            <a:pPr marL="520700" lvl="1" indent="-342900">
+              <a:buFontTx/>
+              <a:buChar char="-"/>
+            </a:pPr>
+            <a:r>
+              <a:rPr lang="en-US" dirty="0"/>
+              <a:t>Docker@2 </a:t>
+            </a:r>
+            <a:r>
+              <a:rPr lang="en-US" dirty="0" err="1"/>
+              <a:t>buildAndPush</a:t>
+            </a:r>
+            <a:endParaRPr lang="en-US" dirty="0"/>
+          </a:p>
+          <a:p>
+            <a:pPr marL="520700" lvl="1" indent="-342900">
+              <a:buFontTx/>
+              <a:buChar char="-"/>
+            </a:pPr>
+            <a:r>
+              <a:rPr lang="nl-NL" dirty="0"/>
+              <a:t>KubernetesManifest@0 </a:t>
+            </a:r>
+            <a:r>
+              <a:rPr lang="nl-NL" dirty="0" err="1"/>
+              <a:t>deploy</a:t>
+            </a:r>
+            <a:endParaRPr lang="nl-NL" dirty="0"/>
+          </a:p>
+        </p:txBody>
+      </p:sp>
+      <p:sp>
+        <p:nvSpPr>
+          <p:cNvPr id="3" name="Title 2">
+            <a:extLst>
+              <a:ext uri="{FF2B5EF4-FFF2-40B4-BE49-F238E27FC236}">
+                <a16:creationId xmlns:a16="http://schemas.microsoft.com/office/drawing/2014/main" id="{42DBAC37-2287-448A-96B8-2AAC6FF313B9}"/>
+              </a:ext>
+            </a:extLst>
+          </p:cNvPr>
+          <p:cNvSpPr>
+            <a:spLocks noGrp="1"/>
+          </p:cNvSpPr>
+          <p:nvPr>
+            <p:ph type="title"/>
+          </p:nvPr>
+        </p:nvSpPr>
+        <p:spPr/>
+        <p:txBody>
+          <a:bodyPr/>
+          <a:lstStyle/>
+          <a:p>
+            <a:r>
+              <a:rPr lang="en-US" dirty="0"/>
+              <a:t>The Pipeline</a:t>
+            </a:r>
+            <a:endParaRPr lang="nl-NL" dirty="0"/>
+          </a:p>
+        </p:txBody>
+      </p:sp>
+    </p:spTree>
+    <p:extLst>
+      <p:ext uri="{BB962C8B-B14F-4D97-AF65-F5344CB8AC3E}">
+        <p14:creationId xmlns:p14="http://schemas.microsoft.com/office/powerpoint/2010/main" val="4005016852"/>
       </p:ext>
     </p:extLst>
   </p:cSld>
@@ -31058,21 +31931,6 @@
 </file>
 
 <file path=customXml/item1.xml><?xml version="1.0" encoding="utf-8"?>
-<p:properties xmlns:p="http://schemas.microsoft.com/office/2006/metadata/properties" xmlns:xsi="http://www.w3.org/2001/XMLSchema-instance" xmlns:pc="http://schemas.microsoft.com/office/infopath/2007/PartnerControls">
-  <documentManagement/>
-</p:properties>
-</file>
-
-<file path=customXml/item2.xml><?xml version="1.0" encoding="utf-8"?>
-<?mso-contentType ?>
-<FormTemplates xmlns="http://schemas.microsoft.com/sharepoint/v3/contenttype/forms">
-  <Display>DocumentLibraryForm</Display>
-  <Edit>DocumentLibraryForm</Edit>
-  <New>DocumentLibraryForm</New>
-</FormTemplates>
-</file>
-
-<file path=customXml/item3.xml><?xml version="1.0" encoding="utf-8"?>
 <ct:contentTypeSchema xmlns:ct="http://schemas.microsoft.com/office/2006/metadata/contentType" xmlns:ma="http://schemas.microsoft.com/office/2006/metadata/properties/metaAttributes" ct:_="" ma:_="" ma:contentTypeName="Document" ma:contentTypeID="0x010100CC423E2E7BBB724EBD66262F8096C02C" ma:contentTypeVersion="12" ma:contentTypeDescription="Create a new document." ma:contentTypeScope="" ma:versionID="029439c3627e46743cc90f720991ec29">
   <xsd:schema xmlns:xsd="http://www.w3.org/2001/XMLSchema" xmlns:xs="http://www.w3.org/2001/XMLSchema" xmlns:p="http://schemas.microsoft.com/office/2006/metadata/properties" xmlns:ns2="3d04ce2b-259a-43e1-b1f9-9b7f7594f86e" xmlns:ns3="5c6beff6-7d87-4e1b-88cc-945dc3351362" targetNamespace="http://schemas.microsoft.com/office/2006/metadata/properties" ma:root="true" ma:fieldsID="7ba44ce8f51f696ada8902b6dfd65b32" ns2:_="" ns3:_="">
     <xsd:import namespace="3d04ce2b-259a-43e1-b1f9-9b7f7594f86e"/>
@@ -31289,24 +32147,22 @@
 </ct:contentTypeSchema>
 </file>
 
-<file path=customXml/itemProps1.xml><?xml version="1.0" encoding="utf-8"?>
-<ds:datastoreItem xmlns:ds="http://schemas.openxmlformats.org/officeDocument/2006/customXml" ds:itemID="{55BD4097-8236-4DCA-AED4-C6EE643A5C0B}">
-  <ds:schemaRefs>
-    <ds:schemaRef ds:uri="http://schemas.microsoft.com/office/2006/metadata/properties"/>
-    <ds:schemaRef ds:uri="http://schemas.microsoft.com/office/infopath/2007/PartnerControls"/>
-  </ds:schemaRefs>
-</ds:datastoreItem>
+<file path=customXml/item2.xml><?xml version="1.0" encoding="utf-8"?>
+<?mso-contentType ?>
+<FormTemplates xmlns="http://schemas.microsoft.com/sharepoint/v3/contenttype/forms">
+  <Display>DocumentLibraryForm</Display>
+  <Edit>DocumentLibraryForm</Edit>
+  <New>DocumentLibraryForm</New>
+</FormTemplates>
 </file>
 
-<file path=customXml/itemProps2.xml><?xml version="1.0" encoding="utf-8"?>
-<ds:datastoreItem xmlns:ds="http://schemas.openxmlformats.org/officeDocument/2006/customXml" ds:itemID="{01C5A25A-3590-4D5F-B7A8-15013516B4CF}">
-  <ds:schemaRefs>
-    <ds:schemaRef ds:uri="http://schemas.microsoft.com/sharepoint/v3/contenttype/forms"/>
-  </ds:schemaRefs>
-</ds:datastoreItem>
+<file path=customXml/item3.xml><?xml version="1.0" encoding="utf-8"?>
+<p:properties xmlns:p="http://schemas.microsoft.com/office/2006/metadata/properties" xmlns:xsi="http://www.w3.org/2001/XMLSchema-instance" xmlns:pc="http://schemas.microsoft.com/office/infopath/2007/PartnerControls">
+  <documentManagement/>
+</p:properties>
 </file>
 
-<file path=customXml/itemProps3.xml><?xml version="1.0" encoding="utf-8"?>
+<file path=customXml/itemProps1.xml><?xml version="1.0" encoding="utf-8"?>
 <ds:datastoreItem xmlns:ds="http://schemas.openxmlformats.org/officeDocument/2006/customXml" ds:itemID="{0558C008-966D-49EA-BDB4-4A4EF4C08853}">
   <ds:schemaRefs>
     <ds:schemaRef ds:uri="http://schemas.microsoft.com/office/2006/metadata/contentType"/>
@@ -31323,4 +32179,21 @@
     <ds:schemaRef ds:uri="http://schemas.microsoft.com/internal/obd"/>
   </ds:schemaRefs>
 </ds:datastoreItem>
+</file>
+
+<file path=customXml/itemProps2.xml><?xml version="1.0" encoding="utf-8"?>
+<ds:datastoreItem xmlns:ds="http://schemas.openxmlformats.org/officeDocument/2006/customXml" ds:itemID="{01C5A25A-3590-4D5F-B7A8-15013516B4CF}">
+  <ds:schemaRefs>
+    <ds:schemaRef ds:uri="http://schemas.microsoft.com/sharepoint/v3/contenttype/forms"/>
+  </ds:schemaRefs>
+</ds:datastoreItem>
+</file>
+
+<file path=customXml/itemProps3.xml><?xml version="1.0" encoding="utf-8"?>
+<ds:datastoreItem xmlns:ds="http://schemas.openxmlformats.org/officeDocument/2006/customXml" ds:itemID="{55BD4097-8236-4DCA-AED4-C6EE643A5C0B}">
+  <ds:schemaRefs>
+    <ds:schemaRef ds:uri="http://schemas.microsoft.com/office/2006/metadata/properties"/>
+    <ds:schemaRef ds:uri="http://schemas.microsoft.com/office/infopath/2007/PartnerControls"/>
+  </ds:schemaRefs>
+</ds:datastoreItem>
 </file>
</xml_diff>

<commit_message>
Testing if the pipelines still work
</commit_message>
<xml_diff>
--- a/slides.pptx
+++ b/slides.pptx
@@ -12,12 +12,13 @@
     <p:sldId id="1057" r:id="rId9"/>
     <p:sldId id="1058" r:id="rId10"/>
     <p:sldId id="1059" r:id="rId11"/>
-    <p:sldId id="1060" r:id="rId12"/>
-    <p:sldId id="1061" r:id="rId13"/>
-    <p:sldId id="1047" r:id="rId14"/>
-    <p:sldId id="1062" r:id="rId15"/>
-    <p:sldId id="1049" r:id="rId16"/>
-    <p:sldId id="1056" r:id="rId17"/>
+    <p:sldId id="1063" r:id="rId12"/>
+    <p:sldId id="1060" r:id="rId13"/>
+    <p:sldId id="1061" r:id="rId14"/>
+    <p:sldId id="1047" r:id="rId15"/>
+    <p:sldId id="1062" r:id="rId16"/>
+    <p:sldId id="1049" r:id="rId17"/>
+    <p:sldId id="1056" r:id="rId18"/>
   </p:sldIdLst>
   <p:sldSz cx="12192000" cy="6858000"/>
   <p:notesSz cx="6858000" cy="9144000"/>
@@ -4453,7 +4454,7 @@
           <a:graphicData uri="http://schemas.openxmlformats.org/presentationml/2006/ole">
             <mc:AlternateContent xmlns:mc="http://schemas.openxmlformats.org/markup-compatibility/2006">
               <mc:Choice xmlns:v="urn:schemas-microsoft-com:vml" Requires="v">
-                <p:oleObj spid="_x0000_s3077" name="think-cell Slide" r:id="rId4" imgW="270" imgH="270" progId="TCLayout.ActiveDocument.1">
+                <p:oleObj spid="_x0000_s3079" name="think-cell Slide" r:id="rId4" imgW="270" imgH="270" progId="TCLayout.ActiveDocument.1">
                   <p:embed/>
                 </p:oleObj>
               </mc:Choice>
@@ -4989,7 +4990,7 @@
           <a:graphicData uri="http://schemas.openxmlformats.org/presentationml/2006/ole">
             <mc:AlternateContent xmlns:mc="http://schemas.openxmlformats.org/markup-compatibility/2006">
               <mc:Choice xmlns:v="urn:schemas-microsoft-com:vml" Requires="v">
-                <p:oleObj spid="_x0000_s4101" name="think-cell Slide" r:id="rId4" imgW="270" imgH="270" progId="TCLayout.ActiveDocument.1">
+                <p:oleObj spid="_x0000_s4103" name="think-cell Slide" r:id="rId4" imgW="270" imgH="270" progId="TCLayout.ActiveDocument.1">
                   <p:embed/>
                 </p:oleObj>
               </mc:Choice>
@@ -5242,7 +5243,7 @@
           <a:graphicData uri="http://schemas.openxmlformats.org/presentationml/2006/ole">
             <mc:AlternateContent xmlns:mc="http://schemas.openxmlformats.org/markup-compatibility/2006">
               <mc:Choice xmlns:v="urn:schemas-microsoft-com:vml" Requires="v">
-                <p:oleObj spid="_x0000_s5125" name="think-cell Slide" r:id="rId4" imgW="270" imgH="270" progId="TCLayout.ActiveDocument.1">
+                <p:oleObj spid="_x0000_s5127" name="think-cell Slide" r:id="rId4" imgW="270" imgH="270" progId="TCLayout.ActiveDocument.1">
                   <p:embed/>
                 </p:oleObj>
               </mc:Choice>
@@ -5495,7 +5496,7 @@
           <a:graphicData uri="http://schemas.openxmlformats.org/presentationml/2006/ole">
             <mc:AlternateContent xmlns:mc="http://schemas.openxmlformats.org/markup-compatibility/2006">
               <mc:Choice xmlns:v="urn:schemas-microsoft-com:vml" Requires="v">
-                <p:oleObj spid="_x0000_s6149" name="think-cell Slide" r:id="rId4" imgW="270" imgH="270" progId="TCLayout.ActiveDocument.1">
+                <p:oleObj spid="_x0000_s6151" name="think-cell Slide" r:id="rId4" imgW="270" imgH="270" progId="TCLayout.ActiveDocument.1">
                   <p:embed/>
                 </p:oleObj>
               </mc:Choice>
@@ -15045,7 +15046,7 @@
           <a:graphicData uri="http://schemas.openxmlformats.org/presentationml/2006/ole">
             <mc:AlternateContent xmlns:mc="http://schemas.openxmlformats.org/markup-compatibility/2006">
               <mc:Choice xmlns:v="urn:schemas-microsoft-com:vml" Requires="v">
-                <p:oleObj spid="_x0000_s2053" name="think-cell Slide" r:id="rId4" imgW="270" imgH="270" progId="TCLayout.ActiveDocument.1">
+                <p:oleObj spid="_x0000_s2055" name="think-cell Slide" r:id="rId4" imgW="270" imgH="270" progId="TCLayout.ActiveDocument.1">
                   <p:embed/>
                 </p:oleObj>
               </mc:Choice>
@@ -16938,7 +16939,7 @@
           <a:graphicData uri="http://schemas.openxmlformats.org/presentationml/2006/ole">
             <mc:AlternateContent xmlns:mc="http://schemas.openxmlformats.org/markup-compatibility/2006">
               <mc:Choice xmlns:v="urn:schemas-microsoft-com:vml" Requires="v">
-                <p:oleObj spid="_x0000_s7173" name="think-cell Slide" r:id="rId4" imgW="270" imgH="270" progId="TCLayout.ActiveDocument.1">
+                <p:oleObj spid="_x0000_s7175" name="think-cell Slide" r:id="rId4" imgW="270" imgH="270" progId="TCLayout.ActiveDocument.1">
                   <p:embed/>
                 </p:oleObj>
               </mc:Choice>
@@ -20554,7 +20555,7 @@
           <a:graphicData uri="http://schemas.openxmlformats.org/presentationml/2006/ole">
             <mc:AlternateContent xmlns:mc="http://schemas.openxmlformats.org/markup-compatibility/2006">
               <mc:Choice xmlns:v="urn:schemas-microsoft-com:vml" Requires="v">
-                <p:oleObj spid="_x0000_s1029" name="think-cell Slide" r:id="rId35" imgW="270" imgH="270" progId="TCLayout.ActiveDocument.1">
+                <p:oleObj spid="_x0000_s1031" name="think-cell Slide" r:id="rId35" imgW="270" imgH="270" progId="TCLayout.ActiveDocument.1">
                   <p:embed/>
                 </p:oleObj>
               </mc:Choice>
@@ -30396,6 +30397,173 @@
       </p:grpSpPr>
       <p:sp>
         <p:nvSpPr>
+          <p:cNvPr id="2" name="Text Placeholder 1">
+            <a:extLst>
+              <a:ext uri="{FF2B5EF4-FFF2-40B4-BE49-F238E27FC236}">
+                <a16:creationId xmlns:a16="http://schemas.microsoft.com/office/drawing/2014/main" id="{57C6FE05-9876-4B0F-A7AB-72302E83887C}"/>
+              </a:ext>
+            </a:extLst>
+          </p:cNvPr>
+          <p:cNvSpPr>
+            <a:spLocks noGrp="1"/>
+          </p:cNvSpPr>
+          <p:nvPr>
+            <p:ph type="body" sz="quarter" idx="10"/>
+          </p:nvPr>
+        </p:nvSpPr>
+        <p:spPr/>
+        <p:txBody>
+          <a:bodyPr/>
+          <a:lstStyle/>
+          <a:p>
+            <a:pPr marL="342900" indent="-342900">
+              <a:buFontTx/>
+              <a:buChar char="-"/>
+            </a:pPr>
+            <a:r>
+              <a:rPr lang="en-US" dirty="0"/>
+              <a:t>Service Connections</a:t>
+            </a:r>
+          </a:p>
+          <a:p>
+            <a:pPr marL="520700" lvl="1" indent="-342900">
+              <a:buFontTx/>
+              <a:buChar char="-"/>
+            </a:pPr>
+            <a:r>
+              <a:rPr lang="en-US" dirty="0"/>
+              <a:t>GitHub</a:t>
+            </a:r>
+          </a:p>
+          <a:p>
+            <a:pPr marL="520700" lvl="1" indent="-342900">
+              <a:buFontTx/>
+              <a:buChar char="-"/>
+            </a:pPr>
+            <a:r>
+              <a:rPr lang="en-US" dirty="0"/>
+              <a:t>Docker Registry</a:t>
+            </a:r>
+          </a:p>
+          <a:p>
+            <a:pPr marL="520700" lvl="1" indent="-342900">
+              <a:buFontTx/>
+              <a:buChar char="-"/>
+            </a:pPr>
+            <a:r>
+              <a:rPr lang="en-US" dirty="0"/>
+              <a:t>Kubernetes </a:t>
+            </a:r>
+          </a:p>
+          <a:p>
+            <a:pPr lvl="1" indent="0">
+              <a:buNone/>
+            </a:pPr>
+            <a:endParaRPr lang="en-US" dirty="0"/>
+          </a:p>
+          <a:p>
+            <a:pPr marL="342900" indent="-342900">
+              <a:buFontTx/>
+              <a:buChar char="-"/>
+            </a:pPr>
+            <a:r>
+              <a:rPr lang="en-US" dirty="0"/>
+              <a:t>Tasks</a:t>
+            </a:r>
+          </a:p>
+          <a:p>
+            <a:pPr marL="520700" lvl="1" indent="-342900">
+              <a:buFontTx/>
+              <a:buChar char="-"/>
+            </a:pPr>
+            <a:r>
+              <a:rPr lang="en-US" dirty="0"/>
+              <a:t>Docker@2 </a:t>
+            </a:r>
+            <a:r>
+              <a:rPr lang="en-US" dirty="0" err="1"/>
+              <a:t>buildAndPush</a:t>
+            </a:r>
+            <a:endParaRPr lang="en-US" dirty="0"/>
+          </a:p>
+          <a:p>
+            <a:pPr marL="520700" lvl="1" indent="-342900">
+              <a:buFontTx/>
+              <a:buChar char="-"/>
+            </a:pPr>
+            <a:r>
+              <a:rPr lang="nl-NL" dirty="0"/>
+              <a:t>KubernetesManifest@0 </a:t>
+            </a:r>
+            <a:r>
+              <a:rPr lang="nl-NL" dirty="0" err="1"/>
+              <a:t>deploy</a:t>
+            </a:r>
+            <a:endParaRPr lang="nl-NL" dirty="0"/>
+          </a:p>
+        </p:txBody>
+      </p:sp>
+      <p:sp>
+        <p:nvSpPr>
+          <p:cNvPr id="3" name="Title 2">
+            <a:extLst>
+              <a:ext uri="{FF2B5EF4-FFF2-40B4-BE49-F238E27FC236}">
+                <a16:creationId xmlns:a16="http://schemas.microsoft.com/office/drawing/2014/main" id="{42DBAC37-2287-448A-96B8-2AAC6FF313B9}"/>
+              </a:ext>
+            </a:extLst>
+          </p:cNvPr>
+          <p:cNvSpPr>
+            <a:spLocks noGrp="1"/>
+          </p:cNvSpPr>
+          <p:nvPr>
+            <p:ph type="title"/>
+          </p:nvPr>
+        </p:nvSpPr>
+        <p:spPr/>
+        <p:txBody>
+          <a:bodyPr/>
+          <a:lstStyle/>
+          <a:p>
+            <a:r>
+              <a:rPr lang="en-US" dirty="0"/>
+              <a:t>The Pipeline</a:t>
+            </a:r>
+            <a:endParaRPr lang="nl-NL" dirty="0"/>
+          </a:p>
+        </p:txBody>
+      </p:sp>
+    </p:spTree>
+    <p:extLst>
+      <p:ext uri="{BB962C8B-B14F-4D97-AF65-F5344CB8AC3E}">
+        <p14:creationId xmlns:p14="http://schemas.microsoft.com/office/powerpoint/2010/main" val="4005016852"/>
+      </p:ext>
+    </p:extLst>
+  </p:cSld>
+  <p:clrMapOvr>
+    <a:masterClrMapping/>
+  </p:clrMapOvr>
+</p:sld>
+</file>
+
+<file path=ppt/slides/slide11.xml><?xml version="1.0" encoding="utf-8"?>
+<p:sld xmlns:a="http://schemas.openxmlformats.org/drawingml/2006/main" xmlns:r="http://schemas.openxmlformats.org/officeDocument/2006/relationships" xmlns:p="http://schemas.openxmlformats.org/presentationml/2006/main">
+  <p:cSld>
+    <p:spTree>
+      <p:nvGrpSpPr>
+        <p:cNvPr id="1" name=""/>
+        <p:cNvGrpSpPr/>
+        <p:nvPr/>
+      </p:nvGrpSpPr>
+      <p:grpSpPr>
+        <a:xfrm>
+          <a:off x="0" y="0"/>
+          <a:ext cx="0" cy="0"/>
+          <a:chOff x="0" y="0"/>
+          <a:chExt cx="0" cy="0"/>
+        </a:xfrm>
+      </p:grpSpPr>
+      <p:sp>
+        <p:nvSpPr>
           <p:cNvPr id="2" name="Subtitle 1">
             <a:extLst>
               <a:ext uri="{FF2B5EF4-FFF2-40B4-BE49-F238E27FC236}">
@@ -30475,7 +30643,7 @@
 </p:sld>
 </file>
 
-<file path=ppt/slides/slide11.xml><?xml version="1.0" encoding="utf-8"?>
+<file path=ppt/slides/slide12.xml><?xml version="1.0" encoding="utf-8"?>
 <p:sld xmlns:a="http://schemas.openxmlformats.org/drawingml/2006/main" xmlns:r="http://schemas.openxmlformats.org/officeDocument/2006/relationships" xmlns:p="http://schemas.openxmlformats.org/presentationml/2006/main">
   <p:cSld>
     <p:spTree>
@@ -30528,10 +30696,10 @@
               <a:buChar char="•"/>
             </a:pPr>
             <a:r>
-              <a:rPr lang="en-US"/>
+              <a:rPr lang="en-US" dirty="0" err="1"/>
               <a:t>GitOps</a:t>
             </a:r>
-            <a:endParaRPr lang="nl-NL"/>
+            <a:endParaRPr lang="nl-NL" dirty="0"/>
           </a:p>
         </p:txBody>
       </p:sp>
@@ -30577,7 +30745,7 @@
 </p:sld>
 </file>
 
-<file path=ppt/slides/slide12.xml><?xml version="1.0" encoding="utf-8"?>
+<file path=ppt/slides/slide13.xml><?xml version="1.0" encoding="utf-8"?>
 <p:sld xmlns:a="http://schemas.openxmlformats.org/drawingml/2006/main" xmlns:r="http://schemas.openxmlformats.org/officeDocument/2006/relationships" xmlns:p="http://schemas.openxmlformats.org/presentationml/2006/main">
   <p:cSld>
     <p:spTree>
@@ -30632,7 +30800,7 @@
 </p:sld>
 </file>
 
-<file path=ppt/slides/slide13.xml><?xml version="1.0" encoding="utf-8"?>
+<file path=ppt/slides/slide14.xml><?xml version="1.0" encoding="utf-8"?>
 <p:sld xmlns:a="http://schemas.openxmlformats.org/drawingml/2006/main" xmlns:r="http://schemas.openxmlformats.org/officeDocument/2006/relationships" xmlns:p="http://schemas.openxmlformats.org/presentationml/2006/main">
   <p:cSld>
     <p:spTree>
@@ -30953,16 +31121,12 @@
               <a:buChar char="•"/>
             </a:pPr>
             <a:r>
-              <a:rPr lang="en-US" dirty="0"/>
-              <a:t>Azure and </a:t>
-            </a:r>
-            <a:r>
               <a:rPr lang="en-US" dirty="0" err="1"/>
               <a:t>.Net</a:t>
             </a:r>
             <a:r>
               <a:rPr lang="en-US" dirty="0"/>
-              <a:t> background</a:t>
+              <a:t>  and Azure background</a:t>
             </a:r>
           </a:p>
           <a:p>
@@ -30972,7 +31136,7 @@
             </a:pPr>
             <a:r>
               <a:rPr lang="en-US" dirty="0"/>
-              <a:t>Certified Azure Solutions Architect and DevOps Engineer Expert</a:t>
+              <a:t>Azure Solutions Architect and DevOps Engineer Expert</a:t>
             </a:r>
           </a:p>
           <a:p>
@@ -31121,7 +31285,7 @@
             </a:pPr>
             <a:r>
               <a:rPr lang="en-US" dirty="0"/>
-              <a:t>Application Gateway (SSL offloading)</a:t>
+              <a:t>Application Gateway (SSL offloading, routing, WAF)</a:t>
             </a:r>
           </a:p>
           <a:p>
@@ -31137,7 +31301,10 @@
               <a:rPr lang="en-US" dirty="0" err="1"/>
               <a:t>Scalesets</a:t>
             </a:r>
-            <a:endParaRPr lang="en-US" dirty="0"/>
+            <a:r>
+              <a:rPr lang="en-US" dirty="0"/>
+              <a:t> (Proximity Groups, Accelerated Networking)</a:t>
+            </a:r>
           </a:p>
           <a:p>
             <a:pPr marL="635000" lvl="1" indent="-457200">
@@ -31373,6 +31540,621 @@
       </p:grpSpPr>
       <p:sp>
         <p:nvSpPr>
+          <p:cNvPr id="3" name="Title 2">
+            <a:extLst>
+              <a:ext uri="{FF2B5EF4-FFF2-40B4-BE49-F238E27FC236}">
+                <a16:creationId xmlns:a16="http://schemas.microsoft.com/office/drawing/2014/main" id="{06442458-94CD-4F15-9B45-FC72B4B8C3AB}"/>
+              </a:ext>
+            </a:extLst>
+          </p:cNvPr>
+          <p:cNvSpPr>
+            <a:spLocks noGrp="1"/>
+          </p:cNvSpPr>
+          <p:nvPr>
+            <p:ph type="title"/>
+          </p:nvPr>
+        </p:nvSpPr>
+        <p:spPr/>
+        <p:txBody>
+          <a:bodyPr/>
+          <a:lstStyle/>
+          <a:p>
+            <a:r>
+              <a:rPr lang="en-US" dirty="0"/>
+              <a:t>Service Connections</a:t>
+            </a:r>
+            <a:endParaRPr lang="nl-NL" dirty="0"/>
+          </a:p>
+        </p:txBody>
+      </p:sp>
+      <p:sp>
+        <p:nvSpPr>
+          <p:cNvPr id="4" name="Rectangle 3">
+            <a:extLst>
+              <a:ext uri="{FF2B5EF4-FFF2-40B4-BE49-F238E27FC236}">
+                <a16:creationId xmlns:a16="http://schemas.microsoft.com/office/drawing/2014/main" id="{63E37AB2-C8C6-4A39-ABF6-F4344AA08E4B}"/>
+              </a:ext>
+            </a:extLst>
+          </p:cNvPr>
+          <p:cNvSpPr/>
+          <p:nvPr/>
+        </p:nvSpPr>
+        <p:spPr>
+          <a:xfrm>
+            <a:off x="1693333" y="3031067"/>
+            <a:ext cx="1794933" cy="931333"/>
+          </a:xfrm>
+          <a:prstGeom prst="rect">
+            <a:avLst/>
+          </a:prstGeom>
+          <a:ln>
+            <a:noFill/>
+          </a:ln>
+        </p:spPr>
+        <p:style>
+          <a:lnRef idx="2">
+            <a:schemeClr val="accent1">
+              <a:shade val="50000"/>
+            </a:schemeClr>
+          </a:lnRef>
+          <a:fillRef idx="1">
+            <a:schemeClr val="accent1"/>
+          </a:fillRef>
+          <a:effectRef idx="0">
+            <a:schemeClr val="accent1"/>
+          </a:effectRef>
+          <a:fontRef idx="minor">
+            <a:schemeClr val="lt1"/>
+          </a:fontRef>
+        </p:style>
+        <p:txBody>
+          <a:bodyPr rtlCol="0" anchor="ctr"/>
+          <a:lstStyle/>
+          <a:p>
+            <a:pPr algn="ctr"/>
+            <a:r>
+              <a:rPr lang="en-US" sz="1600" dirty="0"/>
+              <a:t>Build Agent</a:t>
+            </a:r>
+            <a:endParaRPr lang="nl-NL" sz="1600" dirty="0" err="1"/>
+          </a:p>
+        </p:txBody>
+      </p:sp>
+      <p:sp>
+        <p:nvSpPr>
+          <p:cNvPr id="5" name="Rectangle 4">
+            <a:extLst>
+              <a:ext uri="{FF2B5EF4-FFF2-40B4-BE49-F238E27FC236}">
+                <a16:creationId xmlns:a16="http://schemas.microsoft.com/office/drawing/2014/main" id="{C685F5AE-0696-4D4B-A8E3-6FD946013AE2}"/>
+              </a:ext>
+            </a:extLst>
+          </p:cNvPr>
+          <p:cNvSpPr/>
+          <p:nvPr/>
+        </p:nvSpPr>
+        <p:spPr>
+          <a:xfrm>
+            <a:off x="4981231" y="3031064"/>
+            <a:ext cx="1794933" cy="931333"/>
+          </a:xfrm>
+          <a:prstGeom prst="rect">
+            <a:avLst/>
+          </a:prstGeom>
+          <a:ln>
+            <a:noFill/>
+          </a:ln>
+        </p:spPr>
+        <p:style>
+          <a:lnRef idx="2">
+            <a:schemeClr val="accent1">
+              <a:shade val="50000"/>
+            </a:schemeClr>
+          </a:lnRef>
+          <a:fillRef idx="1">
+            <a:schemeClr val="accent1"/>
+          </a:fillRef>
+          <a:effectRef idx="0">
+            <a:schemeClr val="accent1"/>
+          </a:effectRef>
+          <a:fontRef idx="minor">
+            <a:schemeClr val="lt1"/>
+          </a:fontRef>
+        </p:style>
+        <p:txBody>
+          <a:bodyPr rtlCol="0" anchor="ctr"/>
+          <a:lstStyle/>
+          <a:p>
+            <a:pPr algn="ctr"/>
+            <a:r>
+              <a:rPr lang="en-US" sz="1600" dirty="0"/>
+              <a:t>Azure Container Registry</a:t>
+            </a:r>
+            <a:endParaRPr lang="nl-NL" sz="1600" dirty="0" err="1"/>
+          </a:p>
+        </p:txBody>
+      </p:sp>
+      <p:sp>
+        <p:nvSpPr>
+          <p:cNvPr id="6" name="Rectangle 5">
+            <a:extLst>
+              <a:ext uri="{FF2B5EF4-FFF2-40B4-BE49-F238E27FC236}">
+                <a16:creationId xmlns:a16="http://schemas.microsoft.com/office/drawing/2014/main" id="{E793372E-290F-41B2-88D8-EA3916235397}"/>
+              </a:ext>
+            </a:extLst>
+          </p:cNvPr>
+          <p:cNvSpPr/>
+          <p:nvPr/>
+        </p:nvSpPr>
+        <p:spPr>
+          <a:xfrm>
+            <a:off x="4981229" y="1418168"/>
+            <a:ext cx="1794933" cy="931333"/>
+          </a:xfrm>
+          <a:prstGeom prst="rect">
+            <a:avLst/>
+          </a:prstGeom>
+          <a:ln>
+            <a:noFill/>
+          </a:ln>
+        </p:spPr>
+        <p:style>
+          <a:lnRef idx="2">
+            <a:schemeClr val="accent1">
+              <a:shade val="50000"/>
+            </a:schemeClr>
+          </a:lnRef>
+          <a:fillRef idx="1">
+            <a:schemeClr val="accent1"/>
+          </a:fillRef>
+          <a:effectRef idx="0">
+            <a:schemeClr val="accent1"/>
+          </a:effectRef>
+          <a:fontRef idx="minor">
+            <a:schemeClr val="lt1"/>
+          </a:fontRef>
+        </p:style>
+        <p:txBody>
+          <a:bodyPr rtlCol="0" anchor="ctr"/>
+          <a:lstStyle/>
+          <a:p>
+            <a:pPr algn="ctr"/>
+            <a:r>
+              <a:rPr lang="en-US" sz="1600" dirty="0"/>
+              <a:t>Git</a:t>
+            </a:r>
+            <a:endParaRPr lang="nl-NL" sz="1600" dirty="0" err="1"/>
+          </a:p>
+        </p:txBody>
+      </p:sp>
+      <p:sp>
+        <p:nvSpPr>
+          <p:cNvPr id="7" name="Rectangle 6">
+            <a:extLst>
+              <a:ext uri="{FF2B5EF4-FFF2-40B4-BE49-F238E27FC236}">
+                <a16:creationId xmlns:a16="http://schemas.microsoft.com/office/drawing/2014/main" id="{E8B53F42-8466-4A1C-A2B5-54BFDEBEC96B}"/>
+              </a:ext>
+            </a:extLst>
+          </p:cNvPr>
+          <p:cNvSpPr/>
+          <p:nvPr/>
+        </p:nvSpPr>
+        <p:spPr>
+          <a:xfrm>
+            <a:off x="4981229" y="4643960"/>
+            <a:ext cx="1794933" cy="931333"/>
+          </a:xfrm>
+          <a:prstGeom prst="rect">
+            <a:avLst/>
+          </a:prstGeom>
+          <a:ln>
+            <a:noFill/>
+          </a:ln>
+        </p:spPr>
+        <p:style>
+          <a:lnRef idx="2">
+            <a:schemeClr val="accent1">
+              <a:shade val="50000"/>
+            </a:schemeClr>
+          </a:lnRef>
+          <a:fillRef idx="1">
+            <a:schemeClr val="accent1"/>
+          </a:fillRef>
+          <a:effectRef idx="0">
+            <a:schemeClr val="accent1"/>
+          </a:effectRef>
+          <a:fontRef idx="minor">
+            <a:schemeClr val="lt1"/>
+          </a:fontRef>
+        </p:style>
+        <p:txBody>
+          <a:bodyPr rtlCol="0" anchor="ctr"/>
+          <a:lstStyle/>
+          <a:p>
+            <a:pPr algn="ctr"/>
+            <a:r>
+              <a:rPr lang="en-US" sz="1600" dirty="0"/>
+              <a:t>Azure Kubernetes Services</a:t>
+            </a:r>
+            <a:endParaRPr lang="nl-NL" sz="1600" dirty="0" err="1"/>
+          </a:p>
+        </p:txBody>
+      </p:sp>
+      <p:cxnSp>
+        <p:nvCxnSpPr>
+          <p:cNvPr id="11" name="Connector: Elbow 10">
+            <a:extLst>
+              <a:ext uri="{FF2B5EF4-FFF2-40B4-BE49-F238E27FC236}">
+                <a16:creationId xmlns:a16="http://schemas.microsoft.com/office/drawing/2014/main" id="{C5826A3C-12A0-4F84-B76C-D527BBEEF268}"/>
+              </a:ext>
+            </a:extLst>
+          </p:cNvPr>
+          <p:cNvCxnSpPr>
+            <a:stCxn id="4" idx="0"/>
+            <a:endCxn id="6" idx="1"/>
+          </p:cNvCxnSpPr>
+          <p:nvPr/>
+        </p:nvCxnSpPr>
+        <p:spPr>
+          <a:xfrm rot="5400000" flipH="1" flipV="1">
+            <a:off x="3212398" y="1262237"/>
+            <a:ext cx="1147232" cy="2390429"/>
+          </a:xfrm>
+          <a:prstGeom prst="bentConnector2">
+            <a:avLst/>
+          </a:prstGeom>
+          <a:ln>
+            <a:tailEnd type="triangle"/>
+          </a:ln>
+        </p:spPr>
+        <p:style>
+          <a:lnRef idx="1">
+            <a:schemeClr val="accent1"/>
+          </a:lnRef>
+          <a:fillRef idx="0">
+            <a:schemeClr val="accent1"/>
+          </a:fillRef>
+          <a:effectRef idx="0">
+            <a:schemeClr val="accent1"/>
+          </a:effectRef>
+          <a:fontRef idx="minor">
+            <a:schemeClr val="tx1"/>
+          </a:fontRef>
+        </p:style>
+      </p:cxnSp>
+      <p:cxnSp>
+        <p:nvCxnSpPr>
+          <p:cNvPr id="13" name="Straight Arrow Connector 12">
+            <a:extLst>
+              <a:ext uri="{FF2B5EF4-FFF2-40B4-BE49-F238E27FC236}">
+                <a16:creationId xmlns:a16="http://schemas.microsoft.com/office/drawing/2014/main" id="{783FAEBE-2E0B-49FA-BB60-B2A8EB70612F}"/>
+              </a:ext>
+            </a:extLst>
+          </p:cNvPr>
+          <p:cNvCxnSpPr>
+            <a:stCxn id="4" idx="3"/>
+            <a:endCxn id="5" idx="1"/>
+          </p:cNvCxnSpPr>
+          <p:nvPr/>
+        </p:nvCxnSpPr>
+        <p:spPr>
+          <a:xfrm flipV="1">
+            <a:off x="3488266" y="3496731"/>
+            <a:ext cx="1492965" cy="3"/>
+          </a:xfrm>
+          <a:prstGeom prst="straightConnector1">
+            <a:avLst/>
+          </a:prstGeom>
+          <a:ln>
+            <a:tailEnd type="triangle"/>
+          </a:ln>
+        </p:spPr>
+        <p:style>
+          <a:lnRef idx="1">
+            <a:schemeClr val="accent1"/>
+          </a:lnRef>
+          <a:fillRef idx="0">
+            <a:schemeClr val="accent1"/>
+          </a:fillRef>
+          <a:effectRef idx="0">
+            <a:schemeClr val="accent1"/>
+          </a:effectRef>
+          <a:fontRef idx="minor">
+            <a:schemeClr val="tx1"/>
+          </a:fontRef>
+        </p:style>
+      </p:cxnSp>
+      <p:cxnSp>
+        <p:nvCxnSpPr>
+          <p:cNvPr id="15" name="Connector: Elbow 14">
+            <a:extLst>
+              <a:ext uri="{FF2B5EF4-FFF2-40B4-BE49-F238E27FC236}">
+                <a16:creationId xmlns:a16="http://schemas.microsoft.com/office/drawing/2014/main" id="{C9A6A3E9-98E3-4DA9-8B96-D666D787C976}"/>
+              </a:ext>
+            </a:extLst>
+          </p:cNvPr>
+          <p:cNvCxnSpPr>
+            <a:stCxn id="4" idx="2"/>
+            <a:endCxn id="7" idx="1"/>
+          </p:cNvCxnSpPr>
+          <p:nvPr/>
+        </p:nvCxnSpPr>
+        <p:spPr>
+          <a:xfrm rot="16200000" flipH="1">
+            <a:off x="3212401" y="3340798"/>
+            <a:ext cx="1147227" cy="2390429"/>
+          </a:xfrm>
+          <a:prstGeom prst="bentConnector2">
+            <a:avLst/>
+          </a:prstGeom>
+          <a:ln>
+            <a:tailEnd type="triangle"/>
+          </a:ln>
+        </p:spPr>
+        <p:style>
+          <a:lnRef idx="1">
+            <a:schemeClr val="accent1"/>
+          </a:lnRef>
+          <a:fillRef idx="0">
+            <a:schemeClr val="accent1"/>
+          </a:fillRef>
+          <a:effectRef idx="0">
+            <a:schemeClr val="accent1"/>
+          </a:effectRef>
+          <a:fontRef idx="minor">
+            <a:schemeClr val="tx1"/>
+          </a:fontRef>
+        </p:style>
+      </p:cxnSp>
+      <p:cxnSp>
+        <p:nvCxnSpPr>
+          <p:cNvPr id="17" name="Connector: Elbow 16">
+            <a:extLst>
+              <a:ext uri="{FF2B5EF4-FFF2-40B4-BE49-F238E27FC236}">
+                <a16:creationId xmlns:a16="http://schemas.microsoft.com/office/drawing/2014/main" id="{A1539D17-FC85-42A7-9BC5-981993B1B35C}"/>
+              </a:ext>
+            </a:extLst>
+          </p:cNvPr>
+          <p:cNvCxnSpPr>
+            <a:stCxn id="7" idx="0"/>
+            <a:endCxn id="5" idx="2"/>
+          </p:cNvCxnSpPr>
+          <p:nvPr/>
+        </p:nvCxnSpPr>
+        <p:spPr>
+          <a:xfrm rot="5400000" flipH="1" flipV="1">
+            <a:off x="5537916" y="4303178"/>
+            <a:ext cx="681563" cy="2"/>
+          </a:xfrm>
+          <a:prstGeom prst="bentConnector3">
+            <a:avLst/>
+          </a:prstGeom>
+          <a:ln>
+            <a:tailEnd type="triangle"/>
+          </a:ln>
+        </p:spPr>
+        <p:style>
+          <a:lnRef idx="1">
+            <a:schemeClr val="accent1"/>
+          </a:lnRef>
+          <a:fillRef idx="0">
+            <a:schemeClr val="accent1"/>
+          </a:fillRef>
+          <a:effectRef idx="0">
+            <a:schemeClr val="accent1"/>
+          </a:effectRef>
+          <a:fontRef idx="minor">
+            <a:schemeClr val="tx1"/>
+          </a:fontRef>
+        </p:style>
+      </p:cxnSp>
+      <p:sp>
+        <p:nvSpPr>
+          <p:cNvPr id="18" name="TextBox 17">
+            <a:extLst>
+              <a:ext uri="{FF2B5EF4-FFF2-40B4-BE49-F238E27FC236}">
+                <a16:creationId xmlns:a16="http://schemas.microsoft.com/office/drawing/2014/main" id="{0BD96544-52A5-4F90-9B20-BD1F8AF8501B}"/>
+              </a:ext>
+            </a:extLst>
+          </p:cNvPr>
+          <p:cNvSpPr txBox="1"/>
+          <p:nvPr/>
+        </p:nvSpPr>
+        <p:spPr>
+          <a:xfrm>
+            <a:off x="2741783" y="1702318"/>
+            <a:ext cx="1492965" cy="369332"/>
+          </a:xfrm>
+          <a:prstGeom prst="rect">
+            <a:avLst/>
+          </a:prstGeom>
+          <a:noFill/>
+        </p:spPr>
+        <p:txBody>
+          <a:bodyPr wrap="square" rtlCol="0">
+            <a:spAutoFit/>
+          </a:bodyPr>
+          <a:lstStyle/>
+          <a:p>
+            <a:r>
+              <a:rPr lang="en-US" dirty="0">
+                <a:solidFill>
+                  <a:schemeClr val="bg1"/>
+                </a:solidFill>
+              </a:rPr>
+              <a:t>Checkout</a:t>
+            </a:r>
+            <a:endParaRPr lang="nl-NL" dirty="0">
+              <a:solidFill>
+                <a:schemeClr val="bg1"/>
+              </a:solidFill>
+            </a:endParaRPr>
+          </a:p>
+        </p:txBody>
+      </p:sp>
+      <p:sp>
+        <p:nvSpPr>
+          <p:cNvPr id="19" name="TextBox 18">
+            <a:extLst>
+              <a:ext uri="{FF2B5EF4-FFF2-40B4-BE49-F238E27FC236}">
+                <a16:creationId xmlns:a16="http://schemas.microsoft.com/office/drawing/2014/main" id="{7631C3FF-51B5-4BD0-9D61-760D47A2DA20}"/>
+              </a:ext>
+            </a:extLst>
+          </p:cNvPr>
+          <p:cNvSpPr txBox="1"/>
+          <p:nvPr/>
+        </p:nvSpPr>
+        <p:spPr>
+          <a:xfrm>
+            <a:off x="3591279" y="3312061"/>
+            <a:ext cx="1492965" cy="369332"/>
+          </a:xfrm>
+          <a:prstGeom prst="rect">
+            <a:avLst/>
+          </a:prstGeom>
+          <a:noFill/>
+        </p:spPr>
+        <p:txBody>
+          <a:bodyPr wrap="square" rtlCol="0">
+            <a:spAutoFit/>
+          </a:bodyPr>
+          <a:lstStyle/>
+          <a:p>
+            <a:r>
+              <a:rPr lang="en-US" dirty="0">
+                <a:solidFill>
+                  <a:schemeClr val="bg1"/>
+                </a:solidFill>
+              </a:rPr>
+              <a:t>Push</a:t>
+            </a:r>
+            <a:endParaRPr lang="nl-NL" dirty="0">
+              <a:solidFill>
+                <a:schemeClr val="bg1"/>
+              </a:solidFill>
+            </a:endParaRPr>
+          </a:p>
+        </p:txBody>
+      </p:sp>
+      <p:sp>
+        <p:nvSpPr>
+          <p:cNvPr id="20" name="TextBox 19">
+            <a:extLst>
+              <a:ext uri="{FF2B5EF4-FFF2-40B4-BE49-F238E27FC236}">
+                <a16:creationId xmlns:a16="http://schemas.microsoft.com/office/drawing/2014/main" id="{0DFCA13E-1F09-4EBB-B347-AD539CDE42FE}"/>
+              </a:ext>
+            </a:extLst>
+          </p:cNvPr>
+          <p:cNvSpPr txBox="1"/>
+          <p:nvPr/>
+        </p:nvSpPr>
+        <p:spPr>
+          <a:xfrm>
+            <a:off x="2741783" y="4924960"/>
+            <a:ext cx="1492965" cy="369332"/>
+          </a:xfrm>
+          <a:prstGeom prst="rect">
+            <a:avLst/>
+          </a:prstGeom>
+          <a:noFill/>
+        </p:spPr>
+        <p:txBody>
+          <a:bodyPr wrap="square" rtlCol="0">
+            <a:spAutoFit/>
+          </a:bodyPr>
+          <a:lstStyle/>
+          <a:p>
+            <a:r>
+              <a:rPr lang="en-US" dirty="0">
+                <a:solidFill>
+                  <a:schemeClr val="bg1"/>
+                </a:solidFill>
+              </a:rPr>
+              <a:t>Apply</a:t>
+            </a:r>
+            <a:endParaRPr lang="nl-NL" dirty="0">
+              <a:solidFill>
+                <a:schemeClr val="bg1"/>
+              </a:solidFill>
+            </a:endParaRPr>
+          </a:p>
+        </p:txBody>
+      </p:sp>
+      <p:sp>
+        <p:nvSpPr>
+          <p:cNvPr id="21" name="TextBox 20">
+            <a:extLst>
+              <a:ext uri="{FF2B5EF4-FFF2-40B4-BE49-F238E27FC236}">
+                <a16:creationId xmlns:a16="http://schemas.microsoft.com/office/drawing/2014/main" id="{C92892C6-8A4A-42CF-AA47-2E58F1FADFCD}"/>
+              </a:ext>
+            </a:extLst>
+          </p:cNvPr>
+          <p:cNvSpPr txBox="1"/>
+          <p:nvPr/>
+        </p:nvSpPr>
+        <p:spPr>
+          <a:xfrm>
+            <a:off x="5566820" y="4118512"/>
+            <a:ext cx="1492965" cy="369332"/>
+          </a:xfrm>
+          <a:prstGeom prst="rect">
+            <a:avLst/>
+          </a:prstGeom>
+          <a:noFill/>
+        </p:spPr>
+        <p:txBody>
+          <a:bodyPr wrap="square" rtlCol="0">
+            <a:spAutoFit/>
+          </a:bodyPr>
+          <a:lstStyle/>
+          <a:p>
+            <a:r>
+              <a:rPr lang="en-US" dirty="0">
+                <a:solidFill>
+                  <a:schemeClr val="bg1"/>
+                </a:solidFill>
+              </a:rPr>
+              <a:t>Pull</a:t>
+            </a:r>
+            <a:endParaRPr lang="nl-NL" dirty="0">
+              <a:solidFill>
+                <a:schemeClr val="bg1"/>
+              </a:solidFill>
+            </a:endParaRPr>
+          </a:p>
+        </p:txBody>
+      </p:sp>
+    </p:spTree>
+    <p:extLst>
+      <p:ext uri="{BB962C8B-B14F-4D97-AF65-F5344CB8AC3E}">
+        <p14:creationId xmlns:p14="http://schemas.microsoft.com/office/powerpoint/2010/main" val="923525899"/>
+      </p:ext>
+    </p:extLst>
+  </p:cSld>
+  <p:clrMapOvr>
+    <a:masterClrMapping/>
+  </p:clrMapOvr>
+</p:sld>
+</file>
+
+<file path=ppt/slides/slide9.xml><?xml version="1.0" encoding="utf-8"?>
+<p:sld xmlns:a="http://schemas.openxmlformats.org/drawingml/2006/main" xmlns:r="http://schemas.openxmlformats.org/officeDocument/2006/relationships" xmlns:p="http://schemas.openxmlformats.org/presentationml/2006/main">
+  <p:cSld>
+    <p:spTree>
+      <p:nvGrpSpPr>
+        <p:cNvPr id="1" name=""/>
+        <p:cNvGrpSpPr/>
+        <p:nvPr/>
+      </p:nvGrpSpPr>
+      <p:grpSpPr>
+        <a:xfrm>
+          <a:off x="0" y="0"/>
+          <a:ext cx="0" cy="0"/>
+          <a:chOff x="0" y="0"/>
+          <a:chExt cx="0" cy="0"/>
+        </a:xfrm>
+      </p:grpSpPr>
+      <p:sp>
+        <p:nvSpPr>
           <p:cNvPr id="2" name="Text Placeholder 1">
             <a:extLst>
               <a:ext uri="{FF2B5EF4-FFF2-40B4-BE49-F238E27FC236}">
@@ -31457,173 +32239,6 @@
     <p:extLst>
       <p:ext uri="{BB962C8B-B14F-4D97-AF65-F5344CB8AC3E}">
         <p14:creationId xmlns:p14="http://schemas.microsoft.com/office/powerpoint/2010/main" val="2538430842"/>
-      </p:ext>
-    </p:extLst>
-  </p:cSld>
-  <p:clrMapOvr>
-    <a:masterClrMapping/>
-  </p:clrMapOvr>
-</p:sld>
-</file>
-
-<file path=ppt/slides/slide9.xml><?xml version="1.0" encoding="utf-8"?>
-<p:sld xmlns:a="http://schemas.openxmlformats.org/drawingml/2006/main" xmlns:r="http://schemas.openxmlformats.org/officeDocument/2006/relationships" xmlns:p="http://schemas.openxmlformats.org/presentationml/2006/main">
-  <p:cSld>
-    <p:spTree>
-      <p:nvGrpSpPr>
-        <p:cNvPr id="1" name=""/>
-        <p:cNvGrpSpPr/>
-        <p:nvPr/>
-      </p:nvGrpSpPr>
-      <p:grpSpPr>
-        <a:xfrm>
-          <a:off x="0" y="0"/>
-          <a:ext cx="0" cy="0"/>
-          <a:chOff x="0" y="0"/>
-          <a:chExt cx="0" cy="0"/>
-        </a:xfrm>
-      </p:grpSpPr>
-      <p:sp>
-        <p:nvSpPr>
-          <p:cNvPr id="2" name="Text Placeholder 1">
-            <a:extLst>
-              <a:ext uri="{FF2B5EF4-FFF2-40B4-BE49-F238E27FC236}">
-                <a16:creationId xmlns:a16="http://schemas.microsoft.com/office/drawing/2014/main" id="{57C6FE05-9876-4B0F-A7AB-72302E83887C}"/>
-              </a:ext>
-            </a:extLst>
-          </p:cNvPr>
-          <p:cNvSpPr>
-            <a:spLocks noGrp="1"/>
-          </p:cNvSpPr>
-          <p:nvPr>
-            <p:ph type="body" sz="quarter" idx="10"/>
-          </p:nvPr>
-        </p:nvSpPr>
-        <p:spPr/>
-        <p:txBody>
-          <a:bodyPr/>
-          <a:lstStyle/>
-          <a:p>
-            <a:pPr marL="342900" indent="-342900">
-              <a:buFontTx/>
-              <a:buChar char="-"/>
-            </a:pPr>
-            <a:r>
-              <a:rPr lang="en-US" dirty="0"/>
-              <a:t>Service Connections</a:t>
-            </a:r>
-          </a:p>
-          <a:p>
-            <a:pPr marL="520700" lvl="1" indent="-342900">
-              <a:buFontTx/>
-              <a:buChar char="-"/>
-            </a:pPr>
-            <a:r>
-              <a:rPr lang="en-US" dirty="0"/>
-              <a:t>GitHub</a:t>
-            </a:r>
-          </a:p>
-          <a:p>
-            <a:pPr marL="520700" lvl="1" indent="-342900">
-              <a:buFontTx/>
-              <a:buChar char="-"/>
-            </a:pPr>
-            <a:r>
-              <a:rPr lang="en-US" dirty="0"/>
-              <a:t>Docker Registry</a:t>
-            </a:r>
-          </a:p>
-          <a:p>
-            <a:pPr marL="520700" lvl="1" indent="-342900">
-              <a:buFontTx/>
-              <a:buChar char="-"/>
-            </a:pPr>
-            <a:r>
-              <a:rPr lang="en-US" dirty="0"/>
-              <a:t>Kubernetes </a:t>
-            </a:r>
-          </a:p>
-          <a:p>
-            <a:pPr lvl="1" indent="0">
-              <a:buNone/>
-            </a:pPr>
-            <a:endParaRPr lang="en-US" dirty="0"/>
-          </a:p>
-          <a:p>
-            <a:pPr marL="342900" indent="-342900">
-              <a:buFontTx/>
-              <a:buChar char="-"/>
-            </a:pPr>
-            <a:r>
-              <a:rPr lang="en-US" dirty="0"/>
-              <a:t>Tasks</a:t>
-            </a:r>
-          </a:p>
-          <a:p>
-            <a:pPr marL="520700" lvl="1" indent="-342900">
-              <a:buFontTx/>
-              <a:buChar char="-"/>
-            </a:pPr>
-            <a:r>
-              <a:rPr lang="en-US" dirty="0"/>
-              <a:t>Docker@2 </a:t>
-            </a:r>
-            <a:r>
-              <a:rPr lang="en-US" dirty="0" err="1"/>
-              <a:t>buildAndPush</a:t>
-            </a:r>
-            <a:endParaRPr lang="en-US" dirty="0"/>
-          </a:p>
-          <a:p>
-            <a:pPr marL="520700" lvl="1" indent="-342900">
-              <a:buFontTx/>
-              <a:buChar char="-"/>
-            </a:pPr>
-            <a:r>
-              <a:rPr lang="nl-NL" dirty="0"/>
-              <a:t>KubernetesManifest@0 </a:t>
-            </a:r>
-            <a:r>
-              <a:rPr lang="nl-NL" dirty="0" err="1"/>
-              <a:t>deploy</a:t>
-            </a:r>
-            <a:endParaRPr lang="nl-NL" dirty="0"/>
-          </a:p>
-        </p:txBody>
-      </p:sp>
-      <p:sp>
-        <p:nvSpPr>
-          <p:cNvPr id="3" name="Title 2">
-            <a:extLst>
-              <a:ext uri="{FF2B5EF4-FFF2-40B4-BE49-F238E27FC236}">
-                <a16:creationId xmlns:a16="http://schemas.microsoft.com/office/drawing/2014/main" id="{42DBAC37-2287-448A-96B8-2AAC6FF313B9}"/>
-              </a:ext>
-            </a:extLst>
-          </p:cNvPr>
-          <p:cNvSpPr>
-            <a:spLocks noGrp="1"/>
-          </p:cNvSpPr>
-          <p:nvPr>
-            <p:ph type="title"/>
-          </p:nvPr>
-        </p:nvSpPr>
-        <p:spPr/>
-        <p:txBody>
-          <a:bodyPr/>
-          <a:lstStyle/>
-          <a:p>
-            <a:r>
-              <a:rPr lang="en-US" dirty="0"/>
-              <a:t>The Pipeline</a:t>
-            </a:r>
-            <a:endParaRPr lang="nl-NL" dirty="0"/>
-          </a:p>
-        </p:txBody>
-      </p:sp>
-    </p:spTree>
-    <p:extLst>
-      <p:ext uri="{BB962C8B-B14F-4D97-AF65-F5344CB8AC3E}">
-        <p14:creationId xmlns:p14="http://schemas.microsoft.com/office/powerpoint/2010/main" val="4005016852"/>
       </p:ext>
     </p:extLst>
   </p:cSld>
@@ -31931,6 +32546,21 @@
 </file>
 
 <file path=customXml/item1.xml><?xml version="1.0" encoding="utf-8"?>
+<p:properties xmlns:p="http://schemas.microsoft.com/office/2006/metadata/properties" xmlns:xsi="http://www.w3.org/2001/XMLSchema-instance" xmlns:pc="http://schemas.microsoft.com/office/infopath/2007/PartnerControls">
+  <documentManagement/>
+</p:properties>
+</file>
+
+<file path=customXml/item2.xml><?xml version="1.0" encoding="utf-8"?>
+<?mso-contentType ?>
+<FormTemplates xmlns="http://schemas.microsoft.com/sharepoint/v3/contenttype/forms">
+  <Display>DocumentLibraryForm</Display>
+  <Edit>DocumentLibraryForm</Edit>
+  <New>DocumentLibraryForm</New>
+</FormTemplates>
+</file>
+
+<file path=customXml/item3.xml><?xml version="1.0" encoding="utf-8"?>
 <ct:contentTypeSchema xmlns:ct="http://schemas.microsoft.com/office/2006/metadata/contentType" xmlns:ma="http://schemas.microsoft.com/office/2006/metadata/properties/metaAttributes" ct:_="" ma:_="" ma:contentTypeName="Document" ma:contentTypeID="0x010100CC423E2E7BBB724EBD66262F8096C02C" ma:contentTypeVersion="12" ma:contentTypeDescription="Create a new document." ma:contentTypeScope="" ma:versionID="029439c3627e46743cc90f720991ec29">
   <xsd:schema xmlns:xsd="http://www.w3.org/2001/XMLSchema" xmlns:xs="http://www.w3.org/2001/XMLSchema" xmlns:p="http://schemas.microsoft.com/office/2006/metadata/properties" xmlns:ns2="3d04ce2b-259a-43e1-b1f9-9b7f7594f86e" xmlns:ns3="5c6beff6-7d87-4e1b-88cc-945dc3351362" targetNamespace="http://schemas.microsoft.com/office/2006/metadata/properties" ma:root="true" ma:fieldsID="7ba44ce8f51f696ada8902b6dfd65b32" ns2:_="" ns3:_="">
     <xsd:import namespace="3d04ce2b-259a-43e1-b1f9-9b7f7594f86e"/>
@@ -32147,22 +32777,24 @@
 </ct:contentTypeSchema>
 </file>
 
-<file path=customXml/item2.xml><?xml version="1.0" encoding="utf-8"?>
-<?mso-contentType ?>
-<FormTemplates xmlns="http://schemas.microsoft.com/sharepoint/v3/contenttype/forms">
-  <Display>DocumentLibraryForm</Display>
-  <Edit>DocumentLibraryForm</Edit>
-  <New>DocumentLibraryForm</New>
-</FormTemplates>
+<file path=customXml/itemProps1.xml><?xml version="1.0" encoding="utf-8"?>
+<ds:datastoreItem xmlns:ds="http://schemas.openxmlformats.org/officeDocument/2006/customXml" ds:itemID="{55BD4097-8236-4DCA-AED4-C6EE643A5C0B}">
+  <ds:schemaRefs>
+    <ds:schemaRef ds:uri="http://schemas.microsoft.com/office/2006/metadata/properties"/>
+    <ds:schemaRef ds:uri="http://schemas.microsoft.com/office/infopath/2007/PartnerControls"/>
+  </ds:schemaRefs>
+</ds:datastoreItem>
 </file>
 
-<file path=customXml/item3.xml><?xml version="1.0" encoding="utf-8"?>
-<p:properties xmlns:p="http://schemas.microsoft.com/office/2006/metadata/properties" xmlns:xsi="http://www.w3.org/2001/XMLSchema-instance" xmlns:pc="http://schemas.microsoft.com/office/infopath/2007/PartnerControls">
-  <documentManagement/>
-</p:properties>
+<file path=customXml/itemProps2.xml><?xml version="1.0" encoding="utf-8"?>
+<ds:datastoreItem xmlns:ds="http://schemas.openxmlformats.org/officeDocument/2006/customXml" ds:itemID="{01C5A25A-3590-4D5F-B7A8-15013516B4CF}">
+  <ds:schemaRefs>
+    <ds:schemaRef ds:uri="http://schemas.microsoft.com/sharepoint/v3/contenttype/forms"/>
+  </ds:schemaRefs>
+</ds:datastoreItem>
 </file>
 
-<file path=customXml/itemProps1.xml><?xml version="1.0" encoding="utf-8"?>
+<file path=customXml/itemProps3.xml><?xml version="1.0" encoding="utf-8"?>
 <ds:datastoreItem xmlns:ds="http://schemas.openxmlformats.org/officeDocument/2006/customXml" ds:itemID="{0558C008-966D-49EA-BDB4-4A4EF4C08853}">
   <ds:schemaRefs>
     <ds:schemaRef ds:uri="http://schemas.microsoft.com/office/2006/metadata/contentType"/>
@@ -32179,21 +32811,4 @@
     <ds:schemaRef ds:uri="http://schemas.microsoft.com/internal/obd"/>
   </ds:schemaRefs>
 </ds:datastoreItem>
-</file>
-
-<file path=customXml/itemProps2.xml><?xml version="1.0" encoding="utf-8"?>
-<ds:datastoreItem xmlns:ds="http://schemas.openxmlformats.org/officeDocument/2006/customXml" ds:itemID="{01C5A25A-3590-4D5F-B7A8-15013516B4CF}">
-  <ds:schemaRefs>
-    <ds:schemaRef ds:uri="http://schemas.microsoft.com/sharepoint/v3/contenttype/forms"/>
-  </ds:schemaRefs>
-</ds:datastoreItem>
-</file>
-
-<file path=customXml/itemProps3.xml><?xml version="1.0" encoding="utf-8"?>
-<ds:datastoreItem xmlns:ds="http://schemas.openxmlformats.org/officeDocument/2006/customXml" ds:itemID="{55BD4097-8236-4DCA-AED4-C6EE643A5C0B}">
-  <ds:schemaRefs>
-    <ds:schemaRef ds:uri="http://schemas.microsoft.com/office/2006/metadata/properties"/>
-    <ds:schemaRef ds:uri="http://schemas.microsoft.com/office/infopath/2007/PartnerControls"/>
-  </ds:schemaRefs>
-</ds:datastoreItem>
 </file>
</xml_diff>

<commit_message>
Updated Slides and Index
</commit_message>
<xml_diff>
--- a/slides.pptx
+++ b/slides.pptx
@@ -13,12 +13,11 @@
     <p:sldId id="1058" r:id="rId10"/>
     <p:sldId id="1059" r:id="rId11"/>
     <p:sldId id="1063" r:id="rId12"/>
-    <p:sldId id="1060" r:id="rId13"/>
-    <p:sldId id="1061" r:id="rId14"/>
-    <p:sldId id="1047" r:id="rId15"/>
-    <p:sldId id="1062" r:id="rId16"/>
-    <p:sldId id="1049" r:id="rId17"/>
-    <p:sldId id="1056" r:id="rId18"/>
+    <p:sldId id="1061" r:id="rId13"/>
+    <p:sldId id="1047" r:id="rId14"/>
+    <p:sldId id="1062" r:id="rId15"/>
+    <p:sldId id="1049" r:id="rId16"/>
+    <p:sldId id="1056" r:id="rId17"/>
   </p:sldIdLst>
   <p:sldSz cx="12192000" cy="6858000"/>
   <p:notesSz cx="6858000" cy="9144000"/>
@@ -4454,7 +4453,7 @@
           <a:graphicData uri="http://schemas.openxmlformats.org/presentationml/2006/ole">
             <mc:AlternateContent xmlns:mc="http://schemas.openxmlformats.org/markup-compatibility/2006">
               <mc:Choice xmlns:v="urn:schemas-microsoft-com:vml" Requires="v">
-                <p:oleObj spid="_x0000_s3079" name="think-cell Slide" r:id="rId4" imgW="270" imgH="270" progId="TCLayout.ActiveDocument.1">
+                <p:oleObj spid="_x0000_s3083" name="think-cell Slide" r:id="rId4" imgW="270" imgH="270" progId="TCLayout.ActiveDocument.1">
                   <p:embed/>
                 </p:oleObj>
               </mc:Choice>
@@ -4990,7 +4989,7 @@
           <a:graphicData uri="http://schemas.openxmlformats.org/presentationml/2006/ole">
             <mc:AlternateContent xmlns:mc="http://schemas.openxmlformats.org/markup-compatibility/2006">
               <mc:Choice xmlns:v="urn:schemas-microsoft-com:vml" Requires="v">
-                <p:oleObj spid="_x0000_s4103" name="think-cell Slide" r:id="rId4" imgW="270" imgH="270" progId="TCLayout.ActiveDocument.1">
+                <p:oleObj spid="_x0000_s4107" name="think-cell Slide" r:id="rId4" imgW="270" imgH="270" progId="TCLayout.ActiveDocument.1">
                   <p:embed/>
                 </p:oleObj>
               </mc:Choice>
@@ -5243,7 +5242,7 @@
           <a:graphicData uri="http://schemas.openxmlformats.org/presentationml/2006/ole">
             <mc:AlternateContent xmlns:mc="http://schemas.openxmlformats.org/markup-compatibility/2006">
               <mc:Choice xmlns:v="urn:schemas-microsoft-com:vml" Requires="v">
-                <p:oleObj spid="_x0000_s5127" name="think-cell Slide" r:id="rId4" imgW="270" imgH="270" progId="TCLayout.ActiveDocument.1">
+                <p:oleObj spid="_x0000_s5131" name="think-cell Slide" r:id="rId4" imgW="270" imgH="270" progId="TCLayout.ActiveDocument.1">
                   <p:embed/>
                 </p:oleObj>
               </mc:Choice>
@@ -5496,7 +5495,7 @@
           <a:graphicData uri="http://schemas.openxmlformats.org/presentationml/2006/ole">
             <mc:AlternateContent xmlns:mc="http://schemas.openxmlformats.org/markup-compatibility/2006">
               <mc:Choice xmlns:v="urn:schemas-microsoft-com:vml" Requires="v">
-                <p:oleObj spid="_x0000_s6151" name="think-cell Slide" r:id="rId4" imgW="270" imgH="270" progId="TCLayout.ActiveDocument.1">
+                <p:oleObj spid="_x0000_s6155" name="think-cell Slide" r:id="rId4" imgW="270" imgH="270" progId="TCLayout.ActiveDocument.1">
                   <p:embed/>
                 </p:oleObj>
               </mc:Choice>
@@ -15046,7 +15045,7 @@
           <a:graphicData uri="http://schemas.openxmlformats.org/presentationml/2006/ole">
             <mc:AlternateContent xmlns:mc="http://schemas.openxmlformats.org/markup-compatibility/2006">
               <mc:Choice xmlns:v="urn:schemas-microsoft-com:vml" Requires="v">
-                <p:oleObj spid="_x0000_s2055" name="think-cell Slide" r:id="rId4" imgW="270" imgH="270" progId="TCLayout.ActiveDocument.1">
+                <p:oleObj spid="_x0000_s2059" name="think-cell Slide" r:id="rId4" imgW="270" imgH="270" progId="TCLayout.ActiveDocument.1">
                   <p:embed/>
                 </p:oleObj>
               </mc:Choice>
@@ -16939,7 +16938,7 @@
           <a:graphicData uri="http://schemas.openxmlformats.org/presentationml/2006/ole">
             <mc:AlternateContent xmlns:mc="http://schemas.openxmlformats.org/markup-compatibility/2006">
               <mc:Choice xmlns:v="urn:schemas-microsoft-com:vml" Requires="v">
-                <p:oleObj spid="_x0000_s7175" name="think-cell Slide" r:id="rId4" imgW="270" imgH="270" progId="TCLayout.ActiveDocument.1">
+                <p:oleObj spid="_x0000_s7179" name="think-cell Slide" r:id="rId4" imgW="270" imgH="270" progId="TCLayout.ActiveDocument.1">
                   <p:embed/>
                 </p:oleObj>
               </mc:Choice>
@@ -20555,7 +20554,7 @@
           <a:graphicData uri="http://schemas.openxmlformats.org/presentationml/2006/ole">
             <mc:AlternateContent xmlns:mc="http://schemas.openxmlformats.org/markup-compatibility/2006">
               <mc:Choice xmlns:v="urn:schemas-microsoft-com:vml" Requires="v">
-                <p:oleObj spid="_x0000_s1031" name="think-cell Slide" r:id="rId35" imgW="270" imgH="270" progId="TCLayout.ActiveDocument.1">
+                <p:oleObj spid="_x0000_s1035" name="think-cell Slide" r:id="rId35" imgW="270" imgH="270" progId="TCLayout.ActiveDocument.1">
                   <p:embed/>
                 </p:oleObj>
               </mc:Choice>
@@ -30397,173 +30396,6 @@
       </p:grpSpPr>
       <p:sp>
         <p:nvSpPr>
-          <p:cNvPr id="2" name="Text Placeholder 1">
-            <a:extLst>
-              <a:ext uri="{FF2B5EF4-FFF2-40B4-BE49-F238E27FC236}">
-                <a16:creationId xmlns:a16="http://schemas.microsoft.com/office/drawing/2014/main" id="{57C6FE05-9876-4B0F-A7AB-72302E83887C}"/>
-              </a:ext>
-            </a:extLst>
-          </p:cNvPr>
-          <p:cNvSpPr>
-            <a:spLocks noGrp="1"/>
-          </p:cNvSpPr>
-          <p:nvPr>
-            <p:ph type="body" sz="quarter" idx="10"/>
-          </p:nvPr>
-        </p:nvSpPr>
-        <p:spPr/>
-        <p:txBody>
-          <a:bodyPr/>
-          <a:lstStyle/>
-          <a:p>
-            <a:pPr marL="342900" indent="-342900">
-              <a:buFontTx/>
-              <a:buChar char="-"/>
-            </a:pPr>
-            <a:r>
-              <a:rPr lang="en-US" dirty="0"/>
-              <a:t>Service Connections</a:t>
-            </a:r>
-          </a:p>
-          <a:p>
-            <a:pPr marL="520700" lvl="1" indent="-342900">
-              <a:buFontTx/>
-              <a:buChar char="-"/>
-            </a:pPr>
-            <a:r>
-              <a:rPr lang="en-US" dirty="0"/>
-              <a:t>GitHub</a:t>
-            </a:r>
-          </a:p>
-          <a:p>
-            <a:pPr marL="520700" lvl="1" indent="-342900">
-              <a:buFontTx/>
-              <a:buChar char="-"/>
-            </a:pPr>
-            <a:r>
-              <a:rPr lang="en-US" dirty="0"/>
-              <a:t>Docker Registry</a:t>
-            </a:r>
-          </a:p>
-          <a:p>
-            <a:pPr marL="520700" lvl="1" indent="-342900">
-              <a:buFontTx/>
-              <a:buChar char="-"/>
-            </a:pPr>
-            <a:r>
-              <a:rPr lang="en-US" dirty="0"/>
-              <a:t>Kubernetes </a:t>
-            </a:r>
-          </a:p>
-          <a:p>
-            <a:pPr lvl="1" indent="0">
-              <a:buNone/>
-            </a:pPr>
-            <a:endParaRPr lang="en-US" dirty="0"/>
-          </a:p>
-          <a:p>
-            <a:pPr marL="342900" indent="-342900">
-              <a:buFontTx/>
-              <a:buChar char="-"/>
-            </a:pPr>
-            <a:r>
-              <a:rPr lang="en-US" dirty="0"/>
-              <a:t>Tasks</a:t>
-            </a:r>
-          </a:p>
-          <a:p>
-            <a:pPr marL="520700" lvl="1" indent="-342900">
-              <a:buFontTx/>
-              <a:buChar char="-"/>
-            </a:pPr>
-            <a:r>
-              <a:rPr lang="en-US" dirty="0"/>
-              <a:t>Docker@2 </a:t>
-            </a:r>
-            <a:r>
-              <a:rPr lang="en-US" dirty="0" err="1"/>
-              <a:t>buildAndPush</a:t>
-            </a:r>
-            <a:endParaRPr lang="en-US" dirty="0"/>
-          </a:p>
-          <a:p>
-            <a:pPr marL="520700" lvl="1" indent="-342900">
-              <a:buFontTx/>
-              <a:buChar char="-"/>
-            </a:pPr>
-            <a:r>
-              <a:rPr lang="nl-NL" dirty="0"/>
-              <a:t>KubernetesManifest@0 </a:t>
-            </a:r>
-            <a:r>
-              <a:rPr lang="nl-NL" dirty="0" err="1"/>
-              <a:t>deploy</a:t>
-            </a:r>
-            <a:endParaRPr lang="nl-NL" dirty="0"/>
-          </a:p>
-        </p:txBody>
-      </p:sp>
-      <p:sp>
-        <p:nvSpPr>
-          <p:cNvPr id="3" name="Title 2">
-            <a:extLst>
-              <a:ext uri="{FF2B5EF4-FFF2-40B4-BE49-F238E27FC236}">
-                <a16:creationId xmlns:a16="http://schemas.microsoft.com/office/drawing/2014/main" id="{42DBAC37-2287-448A-96B8-2AAC6FF313B9}"/>
-              </a:ext>
-            </a:extLst>
-          </p:cNvPr>
-          <p:cNvSpPr>
-            <a:spLocks noGrp="1"/>
-          </p:cNvSpPr>
-          <p:nvPr>
-            <p:ph type="title"/>
-          </p:nvPr>
-        </p:nvSpPr>
-        <p:spPr/>
-        <p:txBody>
-          <a:bodyPr/>
-          <a:lstStyle/>
-          <a:p>
-            <a:r>
-              <a:rPr lang="en-US" dirty="0"/>
-              <a:t>The Pipeline</a:t>
-            </a:r>
-            <a:endParaRPr lang="nl-NL" dirty="0"/>
-          </a:p>
-        </p:txBody>
-      </p:sp>
-    </p:spTree>
-    <p:extLst>
-      <p:ext uri="{BB962C8B-B14F-4D97-AF65-F5344CB8AC3E}">
-        <p14:creationId xmlns:p14="http://schemas.microsoft.com/office/powerpoint/2010/main" val="4005016852"/>
-      </p:ext>
-    </p:extLst>
-  </p:cSld>
-  <p:clrMapOvr>
-    <a:masterClrMapping/>
-  </p:clrMapOvr>
-</p:sld>
-</file>
-
-<file path=ppt/slides/slide11.xml><?xml version="1.0" encoding="utf-8"?>
-<p:sld xmlns:a="http://schemas.openxmlformats.org/drawingml/2006/main" xmlns:r="http://schemas.openxmlformats.org/officeDocument/2006/relationships" xmlns:p="http://schemas.openxmlformats.org/presentationml/2006/main">
-  <p:cSld>
-    <p:spTree>
-      <p:nvGrpSpPr>
-        <p:cNvPr id="1" name=""/>
-        <p:cNvGrpSpPr/>
-        <p:nvPr/>
-      </p:nvGrpSpPr>
-      <p:grpSpPr>
-        <a:xfrm>
-          <a:off x="0" y="0"/>
-          <a:ext cx="0" cy="0"/>
-          <a:chOff x="0" y="0"/>
-          <a:chExt cx="0" cy="0"/>
-        </a:xfrm>
-      </p:grpSpPr>
-      <p:sp>
-        <p:nvSpPr>
           <p:cNvPr id="2" name="Subtitle 1">
             <a:extLst>
               <a:ext uri="{FF2B5EF4-FFF2-40B4-BE49-F238E27FC236}">
@@ -30608,7 +30440,7 @@
           <a:bodyPr/>
           <a:lstStyle/>
           <a:p>
-            <a:endParaRPr lang="nl-NL"/>
+            <a:endParaRPr lang="nl-NL" dirty="0"/>
           </a:p>
         </p:txBody>
       </p:sp>
@@ -30643,7 +30475,7 @@
 </p:sld>
 </file>
 
-<file path=ppt/slides/slide12.xml><?xml version="1.0" encoding="utf-8"?>
+<file path=ppt/slides/slide11.xml><?xml version="1.0" encoding="utf-8"?>
 <p:sld xmlns:a="http://schemas.openxmlformats.org/drawingml/2006/main" xmlns:r="http://schemas.openxmlformats.org/officeDocument/2006/relationships" xmlns:p="http://schemas.openxmlformats.org/presentationml/2006/main">
   <p:cSld>
     <p:spTree>
@@ -30687,7 +30519,7 @@
             </a:pPr>
             <a:r>
               <a:rPr lang="en-US" dirty="0"/>
-              <a:t>Helm</a:t>
+              <a:t>Deployment in Git, separated per branch</a:t>
             </a:r>
           </a:p>
           <a:p>
@@ -30696,9 +30528,57 @@
               <a:buChar char="•"/>
             </a:pPr>
             <a:r>
-              <a:rPr lang="en-US" dirty="0" err="1"/>
-              <a:t>GitOps</a:t>
+              <a:rPr lang="en-US" dirty="0"/>
+              <a:t>K8S monitors the branch and applies changes</a:t>
             </a:r>
+          </a:p>
+          <a:p>
+            <a:pPr marL="342900" indent="-342900">
+              <a:buFont typeface="Arial" panose="020B0604020202020204" pitchFamily="34" charset="0"/>
+              <a:buChar char="•"/>
+            </a:pPr>
+            <a:endParaRPr lang="en-US" dirty="0"/>
+          </a:p>
+          <a:p>
+            <a:pPr marL="342900" indent="-342900">
+              <a:buFont typeface="Arial" panose="020B0604020202020204" pitchFamily="34" charset="0"/>
+              <a:buChar char="•"/>
+            </a:pPr>
+            <a:r>
+              <a:rPr lang="en-US" dirty="0"/>
+              <a:t>Moving from Dev =&gt; Acc =&gt; Prod using Merges/Pull Request</a:t>
+            </a:r>
+          </a:p>
+          <a:p>
+            <a:pPr marL="342900" indent="-342900">
+              <a:buFont typeface="Arial" panose="020B0604020202020204" pitchFamily="34" charset="0"/>
+              <a:buChar char="•"/>
+            </a:pPr>
+            <a:r>
+              <a:rPr lang="en-US" dirty="0"/>
+              <a:t>Great Disaster Recovery (infra </a:t>
+            </a:r>
+            <a:r>
+              <a:rPr lang="en-US"/>
+              <a:t>as code)</a:t>
+            </a:r>
+            <a:endParaRPr lang="en-US" dirty="0"/>
+          </a:p>
+          <a:p>
+            <a:pPr marL="342900" indent="-342900">
+              <a:buFont typeface="Arial" panose="020B0604020202020204" pitchFamily="34" charset="0"/>
+              <a:buChar char="•"/>
+            </a:pPr>
+            <a:r>
+              <a:rPr lang="en-US" dirty="0"/>
+              <a:t>Easy pipelines</a:t>
+            </a:r>
+          </a:p>
+          <a:p>
+            <a:pPr marL="342900" indent="-342900">
+              <a:buFont typeface="Arial" panose="020B0604020202020204" pitchFamily="34" charset="0"/>
+              <a:buChar char="•"/>
+            </a:pPr>
             <a:endParaRPr lang="nl-NL" dirty="0"/>
           </a:p>
         </p:txBody>
@@ -30725,13 +30605,94 @@
           <a:lstStyle/>
           <a:p>
             <a:r>
-              <a:rPr lang="en-US" dirty="0"/>
-              <a:t>Alternatives</a:t>
+              <a:rPr lang="en-US" dirty="0" err="1"/>
+              <a:t>GitOps</a:t>
             </a:r>
             <a:endParaRPr lang="nl-NL" dirty="0"/>
           </a:p>
         </p:txBody>
       </p:sp>
+      <p:sp>
+        <p:nvSpPr>
+          <p:cNvPr id="2" name="TextBox 1">
+            <a:extLst>
+              <a:ext uri="{FF2B5EF4-FFF2-40B4-BE49-F238E27FC236}">
+                <a16:creationId xmlns:a16="http://schemas.microsoft.com/office/drawing/2014/main" id="{6697EA28-8B43-421F-B53B-A13A655D61A7}"/>
+              </a:ext>
+            </a:extLst>
+          </p:cNvPr>
+          <p:cNvSpPr txBox="1"/>
+          <p:nvPr/>
+        </p:nvSpPr>
+        <p:spPr>
+          <a:xfrm>
+            <a:off x="3250457" y="3539067"/>
+            <a:ext cx="8340612" cy="2844800"/>
+          </a:xfrm>
+          <a:prstGeom prst="rect">
+            <a:avLst/>
+          </a:prstGeom>
+          <a:solidFill>
+            <a:schemeClr val="bg1"/>
+          </a:solidFill>
+        </p:spPr>
+        <p:txBody>
+          <a:bodyPr wrap="square" rtlCol="0">
+            <a:spAutoFit/>
+          </a:bodyPr>
+          <a:lstStyle/>
+          <a:p>
+            <a:endParaRPr lang="nl-NL" dirty="0"/>
+          </a:p>
+        </p:txBody>
+      </p:sp>
+      <p:pic>
+        <p:nvPicPr>
+          <p:cNvPr id="8" name="Picture 6" descr="Multiple applications and environments">
+            <a:extLst>
+              <a:ext uri="{FF2B5EF4-FFF2-40B4-BE49-F238E27FC236}">
+                <a16:creationId xmlns:a16="http://schemas.microsoft.com/office/drawing/2014/main" id="{25D8675A-5FB5-4590-AD13-DEBE33B2719B}"/>
+              </a:ext>
+            </a:extLst>
+          </p:cNvPr>
+          <p:cNvPicPr>
+            <a:picLocks noChangeAspect="1" noChangeArrowheads="1"/>
+          </p:cNvPicPr>
+          <p:nvPr/>
+        </p:nvPicPr>
+        <p:blipFill>
+          <a:blip r:embed="rId2">
+            <a:extLst>
+              <a:ext uri="{28A0092B-C50C-407E-A947-70E740481C1C}">
+                <a14:useLocalDpi xmlns:a14="http://schemas.microsoft.com/office/drawing/2010/main" val="0"/>
+              </a:ext>
+            </a:extLst>
+          </a:blip>
+          <a:srcRect/>
+          <a:stretch>
+            <a:fillRect/>
+          </a:stretch>
+        </p:blipFill>
+        <p:spPr bwMode="auto">
+          <a:xfrm>
+            <a:off x="3488941" y="3925268"/>
+            <a:ext cx="7863644" cy="2072398"/>
+          </a:xfrm>
+          <a:prstGeom prst="rect">
+            <a:avLst/>
+          </a:prstGeom>
+          <a:noFill/>
+          <a:extLst>
+            <a:ext uri="{909E8E84-426E-40DD-AFC4-6F175D3DCCD1}">
+              <a14:hiddenFill xmlns:a14="http://schemas.microsoft.com/office/drawing/2010/main">
+                <a:solidFill>
+                  <a:srgbClr val="FFFFFF"/>
+                </a:solidFill>
+              </a14:hiddenFill>
+            </a:ext>
+          </a:extLst>
+        </p:spPr>
+      </p:pic>
     </p:spTree>
     <p:extLst>
       <p:ext uri="{BB962C8B-B14F-4D97-AF65-F5344CB8AC3E}">
@@ -30745,7 +30706,7 @@
 </p:sld>
 </file>
 
-<file path=ppt/slides/slide13.xml><?xml version="1.0" encoding="utf-8"?>
+<file path=ppt/slides/slide12.xml><?xml version="1.0" encoding="utf-8"?>
 <p:sld xmlns:a="http://schemas.openxmlformats.org/drawingml/2006/main" xmlns:r="http://schemas.openxmlformats.org/officeDocument/2006/relationships" xmlns:p="http://schemas.openxmlformats.org/presentationml/2006/main">
   <p:cSld>
     <p:spTree>
@@ -30800,7 +30761,7 @@
 </p:sld>
 </file>
 
-<file path=ppt/slides/slide14.xml><?xml version="1.0" encoding="utf-8"?>
+<file path=ppt/slides/slide13.xml><?xml version="1.0" encoding="utf-8"?>
 <p:sld xmlns:a="http://schemas.openxmlformats.org/drawingml/2006/main" xmlns:r="http://schemas.openxmlformats.org/officeDocument/2006/relationships" xmlns:p="http://schemas.openxmlformats.org/presentationml/2006/main">
   <p:cSld>
     <p:spTree>
@@ -31137,6 +31098,30 @@
             <a:r>
               <a:rPr lang="en-US" dirty="0"/>
               <a:t>Azure Solutions Architect and DevOps Engineer Expert</a:t>
+            </a:r>
+          </a:p>
+          <a:p>
+            <a:pPr marL="342900" indent="-342900">
+              <a:buFont typeface="Arial" panose="020B0604020202020204" pitchFamily="34" charset="0"/>
+              <a:buChar char="•"/>
+            </a:pPr>
+            <a:endParaRPr lang="en-US" dirty="0"/>
+          </a:p>
+          <a:p>
+            <a:pPr marL="342900" indent="-342900">
+              <a:buFont typeface="Arial" panose="020B0604020202020204" pitchFamily="34" charset="0"/>
+              <a:buChar char="•"/>
+            </a:pPr>
+            <a:endParaRPr lang="en-US" dirty="0"/>
+          </a:p>
+          <a:p>
+            <a:pPr marL="342900" indent="-342900">
+              <a:buFont typeface="Arial" panose="020B0604020202020204" pitchFamily="34" charset="0"/>
+              <a:buChar char="•"/>
+            </a:pPr>
+            <a:r>
+              <a:rPr lang="en-US" dirty="0"/>
+              <a:t>Find todays demo and slides at https://github.com/joostwent/techtalk-lunch</a:t>
             </a:r>
           </a:p>
           <a:p>
@@ -32158,7 +32143,7 @@
           <p:cNvPr id="2" name="Text Placeholder 1">
             <a:extLst>
               <a:ext uri="{FF2B5EF4-FFF2-40B4-BE49-F238E27FC236}">
-                <a16:creationId xmlns:a16="http://schemas.microsoft.com/office/drawing/2014/main" id="{B8E6636C-8E98-4D93-BD37-2A1299ED96DD}"/>
+                <a16:creationId xmlns:a16="http://schemas.microsoft.com/office/drawing/2014/main" id="{57C6FE05-9876-4B0F-A7AB-72302E83887C}"/>
               </a:ext>
             </a:extLst>
           </p:cNvPr>
@@ -32180,8 +32165,44 @@
             </a:pPr>
             <a:r>
               <a:rPr lang="en-US" dirty="0"/>
-              <a:t>Access to our code</a:t>
+              <a:t>Service Connections</a:t>
             </a:r>
+          </a:p>
+          <a:p>
+            <a:pPr marL="520700" lvl="1" indent="-342900">
+              <a:buFontTx/>
+              <a:buChar char="-"/>
+            </a:pPr>
+            <a:r>
+              <a:rPr lang="en-US" dirty="0"/>
+              <a:t>GitHub</a:t>
+            </a:r>
+          </a:p>
+          <a:p>
+            <a:pPr marL="520700" lvl="1" indent="-342900">
+              <a:buFontTx/>
+              <a:buChar char="-"/>
+            </a:pPr>
+            <a:r>
+              <a:rPr lang="en-US" dirty="0"/>
+              <a:t>Docker Registry</a:t>
+            </a:r>
+          </a:p>
+          <a:p>
+            <a:pPr marL="520700" lvl="1" indent="-342900">
+              <a:buFontTx/>
+              <a:buChar char="-"/>
+            </a:pPr>
+            <a:r>
+              <a:rPr lang="en-US" dirty="0"/>
+              <a:t>Kubernetes </a:t>
+            </a:r>
+          </a:p>
+          <a:p>
+            <a:pPr lvl="1" indent="0">
+              <a:buNone/>
+            </a:pPr>
+            <a:endParaRPr lang="en-US" dirty="0"/>
           </a:p>
           <a:p>
             <a:pPr marL="342900" indent="-342900">
@@ -32190,17 +32211,36 @@
             </a:pPr>
             <a:r>
               <a:rPr lang="en-US" dirty="0"/>
-              <a:t>Access to the container registry</a:t>
+              <a:t>Tasks</a:t>
             </a:r>
           </a:p>
           <a:p>
-            <a:pPr marL="342900" indent="-342900">
+            <a:pPr marL="520700" lvl="1" indent="-342900">
               <a:buFontTx/>
               <a:buChar char="-"/>
             </a:pPr>
             <a:r>
               <a:rPr lang="en-US" dirty="0"/>
-              <a:t>Access to Kubernetes</a:t>
+              <a:t>Docker@2 </a:t>
+            </a:r>
+            <a:r>
+              <a:rPr lang="en-US" dirty="0" err="1"/>
+              <a:t>buildAndPush</a:t>
+            </a:r>
+            <a:endParaRPr lang="en-US" dirty="0"/>
+          </a:p>
+          <a:p>
+            <a:pPr marL="520700" lvl="1" indent="-342900">
+              <a:buFontTx/>
+              <a:buChar char="-"/>
+            </a:pPr>
+            <a:r>
+              <a:rPr lang="nl-NL" dirty="0"/>
+              <a:t>KubernetesManifest@0 </a:t>
+            </a:r>
+            <a:r>
+              <a:rPr lang="nl-NL" dirty="0" err="1"/>
+              <a:t>deploy</a:t>
             </a:r>
             <a:endParaRPr lang="nl-NL" dirty="0"/>
           </a:p>
@@ -32211,7 +32251,7 @@
           <p:cNvPr id="3" name="Title 2">
             <a:extLst>
               <a:ext uri="{FF2B5EF4-FFF2-40B4-BE49-F238E27FC236}">
-                <a16:creationId xmlns:a16="http://schemas.microsoft.com/office/drawing/2014/main" id="{F87F16E8-D99F-4D9C-9786-DDC7C7D4A47A}"/>
+                <a16:creationId xmlns:a16="http://schemas.microsoft.com/office/drawing/2014/main" id="{42DBAC37-2287-448A-96B8-2AAC6FF313B9}"/>
               </a:ext>
             </a:extLst>
           </p:cNvPr>
@@ -32229,7 +32269,7 @@
           <a:p>
             <a:r>
               <a:rPr lang="en-US" dirty="0"/>
-              <a:t>What do we need in our pipeline</a:t>
+              <a:t>The Pipeline</a:t>
             </a:r>
             <a:endParaRPr lang="nl-NL" dirty="0"/>
           </a:p>
@@ -32238,7 +32278,7 @@
     </p:spTree>
     <p:extLst>
       <p:ext uri="{BB962C8B-B14F-4D97-AF65-F5344CB8AC3E}">
-        <p14:creationId xmlns:p14="http://schemas.microsoft.com/office/powerpoint/2010/main" val="2538430842"/>
+        <p14:creationId xmlns:p14="http://schemas.microsoft.com/office/powerpoint/2010/main" val="4005016852"/>
       </p:ext>
     </p:extLst>
   </p:cSld>
@@ -32546,21 +32586,6 @@
 </file>
 
 <file path=customXml/item1.xml><?xml version="1.0" encoding="utf-8"?>
-<p:properties xmlns:p="http://schemas.microsoft.com/office/2006/metadata/properties" xmlns:xsi="http://www.w3.org/2001/XMLSchema-instance" xmlns:pc="http://schemas.microsoft.com/office/infopath/2007/PartnerControls">
-  <documentManagement/>
-</p:properties>
-</file>
-
-<file path=customXml/item2.xml><?xml version="1.0" encoding="utf-8"?>
-<?mso-contentType ?>
-<FormTemplates xmlns="http://schemas.microsoft.com/sharepoint/v3/contenttype/forms">
-  <Display>DocumentLibraryForm</Display>
-  <Edit>DocumentLibraryForm</Edit>
-  <New>DocumentLibraryForm</New>
-</FormTemplates>
-</file>
-
-<file path=customXml/item3.xml><?xml version="1.0" encoding="utf-8"?>
 <ct:contentTypeSchema xmlns:ct="http://schemas.microsoft.com/office/2006/metadata/contentType" xmlns:ma="http://schemas.microsoft.com/office/2006/metadata/properties/metaAttributes" ct:_="" ma:_="" ma:contentTypeName="Document" ma:contentTypeID="0x010100CC423E2E7BBB724EBD66262F8096C02C" ma:contentTypeVersion="12" ma:contentTypeDescription="Create a new document." ma:contentTypeScope="" ma:versionID="029439c3627e46743cc90f720991ec29">
   <xsd:schema xmlns:xsd="http://www.w3.org/2001/XMLSchema" xmlns:xs="http://www.w3.org/2001/XMLSchema" xmlns:p="http://schemas.microsoft.com/office/2006/metadata/properties" xmlns:ns2="3d04ce2b-259a-43e1-b1f9-9b7f7594f86e" xmlns:ns3="5c6beff6-7d87-4e1b-88cc-945dc3351362" targetNamespace="http://schemas.microsoft.com/office/2006/metadata/properties" ma:root="true" ma:fieldsID="7ba44ce8f51f696ada8902b6dfd65b32" ns2:_="" ns3:_="">
     <xsd:import namespace="3d04ce2b-259a-43e1-b1f9-9b7f7594f86e"/>
@@ -32777,24 +32802,22 @@
 </ct:contentTypeSchema>
 </file>
 
-<file path=customXml/itemProps1.xml><?xml version="1.0" encoding="utf-8"?>
-<ds:datastoreItem xmlns:ds="http://schemas.openxmlformats.org/officeDocument/2006/customXml" ds:itemID="{55BD4097-8236-4DCA-AED4-C6EE643A5C0B}">
-  <ds:schemaRefs>
-    <ds:schemaRef ds:uri="http://schemas.microsoft.com/office/2006/metadata/properties"/>
-    <ds:schemaRef ds:uri="http://schemas.microsoft.com/office/infopath/2007/PartnerControls"/>
-  </ds:schemaRefs>
-</ds:datastoreItem>
+<file path=customXml/item2.xml><?xml version="1.0" encoding="utf-8"?>
+<?mso-contentType ?>
+<FormTemplates xmlns="http://schemas.microsoft.com/sharepoint/v3/contenttype/forms">
+  <Display>DocumentLibraryForm</Display>
+  <Edit>DocumentLibraryForm</Edit>
+  <New>DocumentLibraryForm</New>
+</FormTemplates>
 </file>
 
-<file path=customXml/itemProps2.xml><?xml version="1.0" encoding="utf-8"?>
-<ds:datastoreItem xmlns:ds="http://schemas.openxmlformats.org/officeDocument/2006/customXml" ds:itemID="{01C5A25A-3590-4D5F-B7A8-15013516B4CF}">
-  <ds:schemaRefs>
-    <ds:schemaRef ds:uri="http://schemas.microsoft.com/sharepoint/v3/contenttype/forms"/>
-  </ds:schemaRefs>
-</ds:datastoreItem>
+<file path=customXml/item3.xml><?xml version="1.0" encoding="utf-8"?>
+<p:properties xmlns:p="http://schemas.microsoft.com/office/2006/metadata/properties" xmlns:xsi="http://www.w3.org/2001/XMLSchema-instance" xmlns:pc="http://schemas.microsoft.com/office/infopath/2007/PartnerControls">
+  <documentManagement/>
+</p:properties>
 </file>
 
-<file path=customXml/itemProps3.xml><?xml version="1.0" encoding="utf-8"?>
+<file path=customXml/itemProps1.xml><?xml version="1.0" encoding="utf-8"?>
 <ds:datastoreItem xmlns:ds="http://schemas.openxmlformats.org/officeDocument/2006/customXml" ds:itemID="{0558C008-966D-49EA-BDB4-4A4EF4C08853}">
   <ds:schemaRefs>
     <ds:schemaRef ds:uri="http://schemas.microsoft.com/office/2006/metadata/contentType"/>
@@ -32811,4 +32834,21 @@
     <ds:schemaRef ds:uri="http://schemas.microsoft.com/internal/obd"/>
   </ds:schemaRefs>
 </ds:datastoreItem>
+</file>
+
+<file path=customXml/itemProps2.xml><?xml version="1.0" encoding="utf-8"?>
+<ds:datastoreItem xmlns:ds="http://schemas.openxmlformats.org/officeDocument/2006/customXml" ds:itemID="{01C5A25A-3590-4D5F-B7A8-15013516B4CF}">
+  <ds:schemaRefs>
+    <ds:schemaRef ds:uri="http://schemas.microsoft.com/sharepoint/v3/contenttype/forms"/>
+  </ds:schemaRefs>
+</ds:datastoreItem>
+</file>
+
+<file path=customXml/itemProps3.xml><?xml version="1.0" encoding="utf-8"?>
+<ds:datastoreItem xmlns:ds="http://schemas.openxmlformats.org/officeDocument/2006/customXml" ds:itemID="{55BD4097-8236-4DCA-AED4-C6EE643A5C0B}">
+  <ds:schemaRefs>
+    <ds:schemaRef ds:uri="http://schemas.microsoft.com/office/2006/metadata/properties"/>
+    <ds:schemaRef ds:uri="http://schemas.microsoft.com/office/infopath/2007/PartnerControls"/>
+  </ds:schemaRefs>
+</ds:datastoreItem>
 </file>
</xml_diff>